<commit_message>
Modif du commentaire des cartes
</commit_message>
<xml_diff>
--- a/Présentation/MODELISATION-DU-NOMBRE-DE-VISITES.pptx
+++ b/Présentation/MODELISATION-DU-NOMBRE-DE-VISITES.pptx
@@ -6804,10 +6804,20 @@
           <a:p>
             <a:pPr algn="just"/>
             <a:r>
+              <a:rPr lang="fr-FR" sz="1600" b="0" i="0" dirty="0">
+                <a:solidFill>
+                  <a:srgbClr val="242424"/>
+                </a:solidFill>
+                <a:effectLst/>
+                <a:latin typeface="Segoe UI" panose="020B0502040204020203" pitchFamily="34" charset="0"/>
+              </a:rPr>
+              <a:t>Les cartes des taux de consultations observés et prédits présentent une similitude notable, ce qui indique une bonne approximation des taux de consultations par le modèle SDM retenu, basé sur les caractéristiques socio-économiques et démographiques des communes</a:t>
+            </a:r>
+            <a:r>
               <a:rPr lang="fr-FR" sz="1600" dirty="0">
                 <a:latin typeface="Gill Sans MT" panose="020B0502020104020203" pitchFamily="34" charset="0"/>
               </a:rPr>
-              <a:t>Les cartes des taux de consultations observé et prédit se ressemblent assez ; ce qui traduit une bonne approximation de taux de consultations par le modèle SDM retenu, en se basant sur les caractéristiques socio-économiques et démographiques des communes.</a:t>
+              <a:t>.</a:t>
             </a:r>
           </a:p>
         </p:txBody>

</xml_diff>

<commit_message>
Quelques modifications sur le poster
</commit_message>
<xml_diff>
--- a/Présentation/MODELISATION-DU-NOMBRE-DE-VISITES.pptx
+++ b/Présentation/MODELISATION-DU-NOMBRE-DE-VISITES.pptx
@@ -197,7 +197,7 @@
           <a:p>
             <a:fld id="{685D38A0-6625-420E-984B-5040EA439569}" type="datetimeFigureOut">
               <a:rPr lang="fr-FR" smtClean="0"/>
-              <a:t>08/04/2025</a:t>
+              <a:t>09/04/2025</a:t>
             </a:fld>
             <a:endParaRPr lang="fr-FR"/>
           </a:p>
@@ -684,7 +684,7 @@
           <a:p>
             <a:fld id="{A9C50A28-6A05-4D1F-9987-845550122DAD}" type="datetimeFigureOut">
               <a:rPr lang="fr-FR" smtClean="0"/>
-              <a:t>08/04/2025</a:t>
+              <a:t>09/04/2025</a:t>
             </a:fld>
             <a:endParaRPr lang="fr-FR"/>
           </a:p>
@@ -854,7 +854,7 @@
           <a:p>
             <a:fld id="{A9C50A28-6A05-4D1F-9987-845550122DAD}" type="datetimeFigureOut">
               <a:rPr lang="fr-FR" smtClean="0"/>
-              <a:t>08/04/2025</a:t>
+              <a:t>09/04/2025</a:t>
             </a:fld>
             <a:endParaRPr lang="fr-FR"/>
           </a:p>
@@ -1034,7 +1034,7 @@
           <a:p>
             <a:fld id="{A9C50A28-6A05-4D1F-9987-845550122DAD}" type="datetimeFigureOut">
               <a:rPr lang="fr-FR" smtClean="0"/>
-              <a:t>08/04/2025</a:t>
+              <a:t>09/04/2025</a:t>
             </a:fld>
             <a:endParaRPr lang="fr-FR"/>
           </a:p>
@@ -1204,7 +1204,7 @@
           <a:p>
             <a:fld id="{A9C50A28-6A05-4D1F-9987-845550122DAD}" type="datetimeFigureOut">
               <a:rPr lang="fr-FR" smtClean="0"/>
-              <a:t>08/04/2025</a:t>
+              <a:t>09/04/2025</a:t>
             </a:fld>
             <a:endParaRPr lang="fr-FR"/>
           </a:p>
@@ -1448,7 +1448,7 @@
           <a:p>
             <a:fld id="{A9C50A28-6A05-4D1F-9987-845550122DAD}" type="datetimeFigureOut">
               <a:rPr lang="fr-FR" smtClean="0"/>
-              <a:t>08/04/2025</a:t>
+              <a:t>09/04/2025</a:t>
             </a:fld>
             <a:endParaRPr lang="fr-FR"/>
           </a:p>
@@ -1680,7 +1680,7 @@
           <a:p>
             <a:fld id="{A9C50A28-6A05-4D1F-9987-845550122DAD}" type="datetimeFigureOut">
               <a:rPr lang="fr-FR" smtClean="0"/>
-              <a:t>08/04/2025</a:t>
+              <a:t>09/04/2025</a:t>
             </a:fld>
             <a:endParaRPr lang="fr-FR"/>
           </a:p>
@@ -2047,7 +2047,7 @@
           <a:p>
             <a:fld id="{A9C50A28-6A05-4D1F-9987-845550122DAD}" type="datetimeFigureOut">
               <a:rPr lang="fr-FR" smtClean="0"/>
-              <a:t>08/04/2025</a:t>
+              <a:t>09/04/2025</a:t>
             </a:fld>
             <a:endParaRPr lang="fr-FR"/>
           </a:p>
@@ -2165,7 +2165,7 @@
           <a:p>
             <a:fld id="{A9C50A28-6A05-4D1F-9987-845550122DAD}" type="datetimeFigureOut">
               <a:rPr lang="fr-FR" smtClean="0"/>
-              <a:t>08/04/2025</a:t>
+              <a:t>09/04/2025</a:t>
             </a:fld>
             <a:endParaRPr lang="fr-FR"/>
           </a:p>
@@ -2260,7 +2260,7 @@
           <a:p>
             <a:fld id="{A9C50A28-6A05-4D1F-9987-845550122DAD}" type="datetimeFigureOut">
               <a:rPr lang="fr-FR" smtClean="0"/>
-              <a:t>08/04/2025</a:t>
+              <a:t>09/04/2025</a:t>
             </a:fld>
             <a:endParaRPr lang="fr-FR"/>
           </a:p>
@@ -2537,7 +2537,7 @@
           <a:p>
             <a:fld id="{A9C50A28-6A05-4D1F-9987-845550122DAD}" type="datetimeFigureOut">
               <a:rPr lang="fr-FR" smtClean="0"/>
-              <a:t>08/04/2025</a:t>
+              <a:t>09/04/2025</a:t>
             </a:fld>
             <a:endParaRPr lang="fr-FR"/>
           </a:p>
@@ -2794,7 +2794,7 @@
           <a:p>
             <a:fld id="{A9C50A28-6A05-4D1F-9987-845550122DAD}" type="datetimeFigureOut">
               <a:rPr lang="fr-FR" smtClean="0"/>
-              <a:t>08/04/2025</a:t>
+              <a:t>09/04/2025</a:t>
             </a:fld>
             <a:endParaRPr lang="fr-FR"/>
           </a:p>
@@ -3013,7 +3013,7 @@
           <a:p>
             <a:fld id="{A9C50A28-6A05-4D1F-9987-845550122DAD}" type="datetimeFigureOut">
               <a:rPr lang="fr-FR" smtClean="0"/>
-              <a:t>08/04/2025</a:t>
+              <a:t>09/04/2025</a:t>
             </a:fld>
             <a:endParaRPr lang="fr-FR"/>
           </a:p>
@@ -3550,7 +3550,7 @@
         </p:nvSpPr>
         <p:spPr>
           <a:xfrm>
-            <a:off x="11025975" y="13616606"/>
+            <a:off x="11025975" y="13602562"/>
             <a:ext cx="10092943" cy="11552171"/>
           </a:xfrm>
           <a:prstGeom prst="roundRect">
@@ -3825,7 +3825,7 @@
           <a:bodyPr rtlCol="0" anchor="ctr"/>
           <a:lstStyle/>
           <a:p>
-            <a:pPr algn="just"/>
+            <a:pPr algn="ctr"/>
             <a:r>
               <a:rPr lang="fr-FR" sz="2400" b="1" dirty="0">
                 <a:solidFill>
@@ -3846,7 +3846,7 @@
             </a:r>
           </a:p>
           <a:p>
-            <a:pPr marL="285750" indent="-285750" algn="just">
+            <a:pPr marL="285750" indent="-285750" algn="ctr">
               <a:buFont typeface="Arial" panose="020B0604020202020204" pitchFamily="34" charset="0"/>
               <a:buChar char="•"/>
             </a:pPr>
@@ -3861,7 +3861,7 @@
             </a:r>
           </a:p>
           <a:p>
-            <a:pPr marL="285750" indent="-285750" algn="just">
+            <a:pPr marL="285750" indent="-285750" algn="ctr">
               <a:buFont typeface="Arial" panose="020B0604020202020204" pitchFamily="34" charset="0"/>
               <a:buChar char="•"/>
             </a:pPr>
@@ -3876,7 +3876,7 @@
             </a:r>
           </a:p>
           <a:p>
-            <a:pPr marL="285750" indent="-285750" algn="just">
+            <a:pPr marL="285750" indent="-285750" algn="ctr">
               <a:buFont typeface="Arial" panose="020B0604020202020204" pitchFamily="34" charset="0"/>
               <a:buChar char="•"/>
             </a:pPr>
@@ -4163,10 +4163,16 @@
           <a:p>
             <a:pPr algn="ctr"/>
             <a:r>
+              <a:rPr lang="fr-FR" sz="2000" b="1" dirty="0">
+                <a:latin typeface="Gill Sans MT" panose="020B0502020104020203" pitchFamily="34" charset="0"/>
+              </a:rPr>
+              <a:t>Tutrice</a:t>
+            </a:r>
+            <a:r>
               <a:rPr lang="fr-FR" sz="2000" dirty="0">
                 <a:latin typeface="Gill Sans MT" panose="020B0502020104020203" pitchFamily="34" charset="0"/>
               </a:rPr>
-              <a:t>Tutrice :  Audrey LAVENU</a:t>
+              <a:t> :  Audrey LAVENU</a:t>
             </a:r>
           </a:p>
         </p:txBody>
@@ -4272,7 +4278,7 @@
           <a:bodyPr rtlCol="0" anchor="ctr"/>
           <a:lstStyle/>
           <a:p>
-            <a:pPr algn="just"/>
+            <a:pPr algn="ctr"/>
             <a:r>
               <a:rPr lang="fr-FR" sz="2400" b="1" dirty="0">
                 <a:solidFill>
@@ -4293,7 +4299,7 @@
             </a:r>
           </a:p>
           <a:p>
-            <a:pPr algn="just"/>
+            <a:pPr algn="ctr"/>
             <a:r>
               <a:rPr lang="fr-FR" sz="2400" dirty="0">
                 <a:solidFill>
@@ -4370,7 +4376,7 @@
         </p:blipFill>
         <p:spPr>
           <a:xfrm>
-            <a:off x="11806196" y="18607300"/>
+            <a:off x="11171505" y="18607300"/>
             <a:ext cx="4314337" cy="2483071"/>
           </a:xfrm>
           <a:prstGeom prst="rect">
@@ -4406,7 +4412,7 @@
           </a:bodyPr>
           <a:lstStyle/>
           <a:p>
-            <a:pPr algn="just"/>
+            <a:pPr algn="ctr"/>
             <a:r>
               <a:rPr lang="fr-FR" sz="2400" b="1" dirty="0">
                 <a:solidFill>
@@ -4445,7 +4451,7 @@
             </a:r>
           </a:p>
           <a:p>
-            <a:pPr algn="just"/>
+            <a:pPr algn="ctr"/>
             <a:r>
               <a:rPr lang="fr-FR" sz="2400" dirty="0">
                 <a:solidFill>
@@ -5060,7 +5066,7 @@
                 </a:ln>
                 <a:latin typeface="Montserrat" panose="02000505000000020004" pitchFamily="2" charset="0"/>
               </a:rPr>
-              <a:t>Méthodes employées</a:t>
+              <a:t>Méthodologie</a:t>
             </a:r>
           </a:p>
         </p:txBody>
@@ -5258,8 +5264,8 @@
         </p:nvSpPr>
         <p:spPr>
           <a:xfrm>
-            <a:off x="2815531" y="279994"/>
-            <a:ext cx="16828973" cy="954107"/>
+            <a:off x="2815532" y="279994"/>
+            <a:ext cx="16700794" cy="954107"/>
           </a:xfrm>
           <a:prstGeom prst="rect">
             <a:avLst/>
@@ -5299,8 +5305,8 @@
         </p:nvSpPr>
         <p:spPr>
           <a:xfrm>
-            <a:off x="877827" y="11499333"/>
-            <a:ext cx="4190214" cy="1077218"/>
+            <a:off x="949888" y="11194437"/>
+            <a:ext cx="4118153" cy="1477328"/>
           </a:xfrm>
           <a:prstGeom prst="rect">
             <a:avLst/>
@@ -5313,9 +5319,9 @@
           </a:bodyPr>
           <a:lstStyle/>
           <a:p>
-            <a:pPr algn="just"/>
-            <a:r>
-              <a:rPr lang="fr-FR" sz="1600" dirty="0">
+            <a:pPr algn="ctr"/>
+            <a:r>
+              <a:rPr lang="fr-FR" dirty="0">
                 <a:latin typeface="Gill Sans MT" panose="020B0502020104020203" pitchFamily="34" charset="0"/>
               </a:rPr>
               <a:t>La distribution, centrée autour de la moyenne, est légèrement asymétrique à droite, traduisant des disparités entre communes, avec quelques zones à taux de consultation très élevé.</a:t>
@@ -5337,8 +5343,8 @@
         </p:nvSpPr>
         <p:spPr>
           <a:xfrm>
-            <a:off x="6403697" y="11376222"/>
-            <a:ext cx="3523593" cy="1323439"/>
+            <a:off x="6403697" y="11294416"/>
+            <a:ext cx="3733549" cy="1477328"/>
           </a:xfrm>
           <a:prstGeom prst="rect">
             <a:avLst/>
@@ -5351,9 +5357,9 @@
           </a:bodyPr>
           <a:lstStyle/>
           <a:p>
-            <a:pPr algn="just"/>
-            <a:r>
-              <a:rPr lang="fr-FR" sz="1600" dirty="0">
+            <a:pPr algn="ctr"/>
+            <a:r>
+              <a:rPr lang="fr-FR" dirty="0">
                 <a:latin typeface="Gill Sans MT" panose="020B0502020104020203" pitchFamily="34" charset="0"/>
               </a:rPr>
               <a:t>Les consultations augmentent avec le taux de natalité et la part des familles avec des enfants jeunes, mais évolue en sens inverse de la part des familles sans enfants et du taux de mortalité.</a:t>
@@ -5375,8 +5381,8 @@
         </p:nvSpPr>
         <p:spPr>
           <a:xfrm>
-            <a:off x="11670670" y="11201108"/>
-            <a:ext cx="3795687" cy="1569660"/>
+            <a:off x="11431215" y="11135902"/>
+            <a:ext cx="4150553" cy="1754326"/>
           </a:xfrm>
           <a:prstGeom prst="rect">
             <a:avLst/>
@@ -5389,9 +5395,9 @@
           </a:bodyPr>
           <a:lstStyle/>
           <a:p>
-            <a:pPr algn="just"/>
-            <a:r>
-              <a:rPr lang="fr-FR" sz="1600" dirty="0">
+            <a:pPr algn="ctr"/>
+            <a:r>
+              <a:rPr lang="fr-FR" dirty="0">
                 <a:latin typeface="Gill Sans MT" panose="020B0502020104020203" pitchFamily="34" charset="0"/>
               </a:rPr>
               <a:t>L’analyse LISA révèle que la majorité des communes appartiennent au cluster HH, suivi du cluster LH, indiquant des zones à taux élevés entourées de communes également à taux élevés, ou à taux bas proches de zones à taux élevés.</a:t>
@@ -5413,8 +5419,8 @@
         </p:nvSpPr>
         <p:spPr>
           <a:xfrm>
-            <a:off x="16831733" y="11215139"/>
-            <a:ext cx="3549864" cy="1323439"/>
+            <a:off x="16636421" y="11081964"/>
+            <a:ext cx="3856711" cy="1754326"/>
           </a:xfrm>
           <a:prstGeom prst="rect">
             <a:avLst/>
@@ -5427,11 +5433,11 @@
           </a:bodyPr>
           <a:lstStyle/>
           <a:p>
-            <a:pPr algn="just">
+            <a:pPr algn="ctr">
               <a:buNone/>
             </a:pPr>
             <a:r>
-              <a:rPr lang="fr-FR" sz="1600" b="0" i="0" dirty="0">
+              <a:rPr lang="fr-FR" b="0" i="0" dirty="0">
                 <a:solidFill>
                   <a:srgbClr val="202124"/>
                 </a:solidFill>
@@ -5440,7 +5446,7 @@
               </a:rPr>
               <a:t>Le diagramme de Moran met en évidence une autocorrélation spatiale positive des taux de consultations, avec des regroupements de communes à taux élevés (High-High) ou faibles (Low-Low).</a:t>
             </a:r>
-            <a:endParaRPr lang="fr-FR" sz="1600" dirty="0">
+            <a:endParaRPr lang="fr-FR" dirty="0">
               <a:latin typeface="Gill Sans MT" panose="020B0502020104020203" pitchFamily="34" charset="0"/>
             </a:endParaRPr>
           </a:p>
@@ -6532,7 +6538,7 @@
           </a:bodyPr>
           <a:lstStyle/>
           <a:p>
-            <a:pPr algn="just">
+            <a:pPr algn="ctr">
               <a:lnSpc>
                 <a:spcPct val="150000"/>
               </a:lnSpc>
@@ -6558,8 +6564,8 @@
           </a:p>
         </p:txBody>
       </p:sp>
-      <mc:AlternateContent xmlns:mc="http://schemas.openxmlformats.org/markup-compatibility/2006" xmlns:a14="http://schemas.microsoft.com/office/drawing/2010/main">
-        <mc:Choice Requires="a14">
+      <mc:AlternateContent xmlns:mc="http://schemas.openxmlformats.org/markup-compatibility/2006">
+        <mc:Choice xmlns:a14="http://schemas.microsoft.com/office/drawing/2010/main" Requires="a14">
           <p:sp>
             <p:nvSpPr>
               <p:cNvPr id="19" name="ZoneTexte 18">
@@ -6574,8 +6580,8 @@
             </p:nvSpPr>
             <p:spPr>
               <a:xfrm>
-                <a:off x="11670670" y="14490641"/>
-                <a:ext cx="4132327" cy="338554"/>
+                <a:off x="11100722" y="14490641"/>
+                <a:ext cx="4702276" cy="400110"/>
               </a:xfrm>
               <a:prstGeom prst="rect">
                 <a:avLst/>
@@ -6593,7 +6599,7 @@
                   <a:buChar char="•"/>
                 </a:pPr>
                 <a:r>
-                  <a:rPr lang="fr-FR" sz="1600" dirty="0">
+                  <a:rPr lang="fr-FR" sz="2000" dirty="0">
                     <a:latin typeface="Gill Sans MT" panose="020B0502020104020203" pitchFamily="34" charset="0"/>
                   </a:rPr>
                   <a:t>L’indice de Moran calculé : </a:t>
@@ -6601,45 +6607,45 @@
                 <a14:m>
                   <m:oMath xmlns:m="http://schemas.openxmlformats.org/officeDocument/2006/math">
                     <m:r>
-                      <a:rPr lang="fr-FR" sz="1600" b="1" i="1" smtClean="0">
+                      <a:rPr lang="fr-FR" sz="2000" b="1" i="1" smtClean="0">
                         <a:latin typeface="Cambria Math" panose="02040503050406030204" pitchFamily="18" charset="0"/>
                       </a:rPr>
                       <m:t>𝑰</m:t>
                     </m:r>
                     <m:r>
-                      <a:rPr lang="fr-FR" sz="1600" b="1" i="1" smtClean="0">
+                      <a:rPr lang="fr-FR" sz="2000" b="1" i="1" smtClean="0">
                         <a:latin typeface="Cambria Math" panose="02040503050406030204" pitchFamily="18" charset="0"/>
                       </a:rPr>
                       <m:t>=</m:t>
                     </m:r>
                     <m:r>
-                      <a:rPr lang="fr-FR" sz="1600" b="1" i="1" smtClean="0">
+                      <a:rPr lang="fr-FR" sz="2000" b="1" i="1" smtClean="0">
                         <a:latin typeface="Cambria Math" panose="02040503050406030204" pitchFamily="18" charset="0"/>
                       </a:rPr>
                       <m:t>𝟎</m:t>
                     </m:r>
                     <m:r>
-                      <a:rPr lang="fr-FR" sz="1600" b="1" i="1" smtClean="0">
+                      <a:rPr lang="fr-FR" sz="2000" b="1" i="1" smtClean="0">
                         <a:latin typeface="Cambria Math" panose="02040503050406030204" pitchFamily="18" charset="0"/>
                       </a:rPr>
                       <m:t>.</m:t>
                     </m:r>
                     <m:r>
-                      <a:rPr lang="fr-FR" sz="1600" b="1" i="1" smtClean="0">
+                      <a:rPr lang="fr-FR" sz="2000" b="1" i="1" smtClean="0">
                         <a:latin typeface="Cambria Math" panose="02040503050406030204" pitchFamily="18" charset="0"/>
                       </a:rPr>
                       <m:t>𝟏𝟓𝟗𝟖</m:t>
                     </m:r>
                   </m:oMath>
                 </a14:m>
-                <a:endParaRPr lang="fr-FR" sz="1600" b="1" dirty="0">
+                <a:endParaRPr lang="fr-FR" sz="2000" b="1" dirty="0">
                   <a:latin typeface="Gill Sans MT" panose="020B0502020104020203" pitchFamily="34" charset="0"/>
                 </a:endParaRPr>
               </a:p>
             </p:txBody>
           </p:sp>
         </mc:Choice>
-        <mc:Fallback xmlns="">
+        <mc:Fallback>
           <p:sp>
             <p:nvSpPr>
               <p:cNvPr id="19" name="ZoneTexte 18">
@@ -6656,8 +6662,8 @@
             </p:nvSpPr>
             <p:spPr>
               <a:xfrm>
-                <a:off x="11670670" y="14490641"/>
-                <a:ext cx="4132327" cy="338554"/>
+                <a:off x="11100722" y="14490641"/>
+                <a:ext cx="4702276" cy="400110"/>
               </a:xfrm>
               <a:prstGeom prst="rect">
                 <a:avLst/>
@@ -6665,7 +6671,7 @@
               <a:blipFill>
                 <a:blip r:embed="rId15"/>
                 <a:stretch>
-                  <a:fillRect l="-590" t="-5357" b="-21429"/>
+                  <a:fillRect l="-1167" t="-7576" b="-25758"/>
                 </a:stretch>
               </a:blipFill>
             </p:spPr>
@@ -6698,8 +6704,8 @@
         </p:nvSpPr>
         <p:spPr>
           <a:xfrm>
-            <a:off x="15772235" y="14542899"/>
-            <a:ext cx="878569" cy="251646"/>
+            <a:off x="15931652" y="14538045"/>
+            <a:ext cx="852973" cy="257699"/>
           </a:xfrm>
           <a:prstGeom prst="stripedRightArrow">
             <a:avLst/>
@@ -6751,7 +6757,7 @@
         <p:spPr>
           <a:xfrm>
             <a:off x="16885608" y="14468346"/>
-            <a:ext cx="4132327" cy="338554"/>
+            <a:ext cx="4132327" cy="400110"/>
           </a:xfrm>
           <a:prstGeom prst="rect">
             <a:avLst/>
@@ -6766,7 +6772,7 @@
           <a:p>
             <a:pPr algn="just"/>
             <a:r>
-              <a:rPr lang="fr-FR" sz="1600" dirty="0">
+              <a:rPr lang="fr-FR" sz="2000" dirty="0">
                 <a:latin typeface="Gill Sans MT" panose="020B0502020104020203" pitchFamily="34" charset="0"/>
               </a:rPr>
               <a:t>Autocorrélation spatiale positive</a:t>
@@ -6788,8 +6794,8 @@
         </p:nvSpPr>
         <p:spPr>
           <a:xfrm>
-            <a:off x="11480481" y="24131218"/>
-            <a:ext cx="9537454" cy="830997"/>
+            <a:off x="11431215" y="24065348"/>
+            <a:ext cx="9537454" cy="1015663"/>
           </a:xfrm>
           <a:prstGeom prst="rect">
             <a:avLst/>
@@ -6802,23 +6808,24 @@
           </a:bodyPr>
           <a:lstStyle/>
           <a:p>
-            <a:pPr algn="just"/>
-            <a:r>
-              <a:rPr lang="fr-FR" sz="1600" b="0" i="0" dirty="0">
+            <a:pPr algn="ctr"/>
+            <a:r>
+              <a:rPr lang="fr-FR" sz="2000" b="0" i="0" dirty="0">
                 <a:solidFill>
                   <a:srgbClr val="242424"/>
                 </a:solidFill>
                 <a:effectLst/>
                 <a:latin typeface="Segoe UI" panose="020B0502040204020203" pitchFamily="34" charset="0"/>
               </a:rPr>
-              <a:t>Les cartes des taux de consultations observés et prédits présentent une similitude notable, ce qui indique une bonne approximation des taux de consultations par le modèle SDM retenu, basé sur les caractéristiques socio-économiques et démographiques des communes</a:t>
-            </a:r>
-            <a:r>
-              <a:rPr lang="fr-FR" sz="1600" dirty="0">
-                <a:latin typeface="Gill Sans MT" panose="020B0502020104020203" pitchFamily="34" charset="0"/>
-              </a:rPr>
-              <a:t>.</a:t>
-            </a:r>
+              <a:t>Les taux de consultations observés et prédits présentent </a:t>
+            </a:r>
+            <a:r>
+              <a:rPr lang="fr-FR" sz="2000" dirty="0"/>
+              <a:t>structure spatiale globalement similaire. Certaines zones, notamment au sud-est et au nord-ouest, mettent toutefois en évidence des divergences marquées entre les valeurs observées et prédites.</a:t>
+            </a:r>
+            <a:endParaRPr lang="fr-FR" sz="2000" dirty="0">
+              <a:latin typeface="Gill Sans MT" panose="020B0502020104020203" pitchFamily="34" charset="0"/>
+            </a:endParaRPr>
           </a:p>
         </p:txBody>
       </p:sp>
@@ -6863,8 +6870,8 @@
           </a:p>
         </p:txBody>
       </p:sp>
-      <mc:AlternateContent xmlns:mc="http://schemas.openxmlformats.org/markup-compatibility/2006" xmlns:a14="http://schemas.microsoft.com/office/drawing/2010/main">
-        <mc:Choice Requires="a14">
+      <mc:AlternateContent xmlns:mc="http://schemas.openxmlformats.org/markup-compatibility/2006">
+        <mc:Choice xmlns:a14="http://schemas.microsoft.com/office/drawing/2010/main" Requires="a14">
           <p:sp>
             <p:nvSpPr>
               <p:cNvPr id="28" name="ZoneTexte 27">
@@ -6879,8 +6886,8 @@
             </p:nvSpPr>
             <p:spPr>
               <a:xfrm>
-                <a:off x="11670670" y="15049817"/>
-                <a:ext cx="4066838" cy="338554"/>
+                <a:off x="11094898" y="14987308"/>
+                <a:ext cx="4920925" cy="400110"/>
               </a:xfrm>
               <a:prstGeom prst="rect">
                 <a:avLst/>
@@ -6898,7 +6905,7 @@
                   <a:buChar char="•"/>
                 </a:pPr>
                 <a:r>
-                  <a:rPr lang="fr-FR" sz="1600" dirty="0">
+                  <a:rPr lang="fr-FR" sz="2000" dirty="0">
                     <a:latin typeface="Gill Sans MT" panose="020B0502020104020203" pitchFamily="34" charset="0"/>
                   </a:rPr>
                   <a:t>Test de Moran : </a:t>
@@ -6906,67 +6913,67 @@
                 <a14:m>
                   <m:oMath xmlns:m="http://schemas.openxmlformats.org/officeDocument/2006/math">
                     <m:r>
-                      <a:rPr lang="fr-FR" sz="1600" b="1" i="0" smtClean="0">
+                      <a:rPr lang="fr-FR" sz="2000" b="1" i="0" smtClean="0">
                         <a:latin typeface="Cambria Math" panose="02040503050406030204" pitchFamily="18" charset="0"/>
                       </a:rPr>
                       <m:t>𝐩</m:t>
                     </m:r>
                     <m:r>
-                      <a:rPr lang="fr-FR" sz="1600" b="1" i="0" smtClean="0">
+                      <a:rPr lang="fr-FR" sz="2000" b="1" i="0" smtClean="0">
                         <a:latin typeface="Cambria Math" panose="02040503050406030204" pitchFamily="18" charset="0"/>
                       </a:rPr>
                       <m:t>−</m:t>
                     </m:r>
                     <m:r>
-                      <a:rPr lang="fr-FR" sz="1600" b="1" i="0" smtClean="0">
+                      <a:rPr lang="fr-FR" sz="2000" b="1" i="0" smtClean="0">
                         <a:latin typeface="Cambria Math" panose="02040503050406030204" pitchFamily="18" charset="0"/>
                       </a:rPr>
                       <m:t>𝐯𝐚𝐥𝐞𝐮𝐫</m:t>
                     </m:r>
                     <m:r>
-                      <a:rPr lang="fr-FR" sz="1600" b="1" i="1" smtClean="0">
+                      <a:rPr lang="fr-FR" sz="2000" b="1" i="1" smtClean="0">
                         <a:latin typeface="Cambria Math" panose="02040503050406030204" pitchFamily="18" charset="0"/>
                         <a:ea typeface="Cambria Math" panose="02040503050406030204" pitchFamily="18" charset="0"/>
                       </a:rPr>
                       <m:t>&lt;</m:t>
                     </m:r>
                     <m:r>
-                      <a:rPr lang="fr-FR" sz="1600" b="1" i="1" smtClean="0">
+                      <a:rPr lang="fr-FR" sz="2000" b="1" i="1" smtClean="0">
                         <a:latin typeface="Cambria Math" panose="02040503050406030204" pitchFamily="18" charset="0"/>
                         <a:ea typeface="Cambria Math" panose="02040503050406030204" pitchFamily="18" charset="0"/>
                       </a:rPr>
                       <m:t>𝟐</m:t>
                     </m:r>
                     <m:r>
-                      <a:rPr lang="fr-FR" sz="1600" b="1" i="1" smtClean="0">
+                      <a:rPr lang="fr-FR" sz="2000" b="1" i="1" smtClean="0">
                         <a:latin typeface="Cambria Math" panose="02040503050406030204" pitchFamily="18" charset="0"/>
                         <a:ea typeface="Cambria Math" panose="02040503050406030204" pitchFamily="18" charset="0"/>
                       </a:rPr>
                       <m:t>.</m:t>
                     </m:r>
                     <m:r>
-                      <a:rPr lang="fr-FR" sz="1600" b="1" i="1" smtClean="0">
+                      <a:rPr lang="fr-FR" sz="2000" b="1" i="1" smtClean="0">
                         <a:latin typeface="Cambria Math" panose="02040503050406030204" pitchFamily="18" charset="0"/>
                         <a:ea typeface="Cambria Math" panose="02040503050406030204" pitchFamily="18" charset="0"/>
                       </a:rPr>
                       <m:t>𝟐</m:t>
                     </m:r>
                     <m:r>
-                      <a:rPr lang="fr-FR" sz="1600" b="1" i="1" smtClean="0">
+                      <a:rPr lang="fr-FR" sz="2000" b="1" i="1" smtClean="0">
                         <a:latin typeface="Cambria Math" panose="02040503050406030204" pitchFamily="18" charset="0"/>
                         <a:ea typeface="Cambria Math" panose="02040503050406030204" pitchFamily="18" charset="0"/>
                       </a:rPr>
                       <m:t>𝒆</m:t>
                     </m:r>
                     <m:r>
-                      <a:rPr lang="fr-FR" sz="1600" b="1" i="1" smtClean="0">
+                      <a:rPr lang="fr-FR" sz="2000" b="1" i="1" smtClean="0">
                         <a:latin typeface="Cambria Math" panose="02040503050406030204" pitchFamily="18" charset="0"/>
                         <a:ea typeface="Cambria Math" panose="02040503050406030204" pitchFamily="18" charset="0"/>
                       </a:rPr>
                       <m:t>−</m:t>
                     </m:r>
                     <m:r>
-                      <a:rPr lang="fr-FR" sz="1600" b="1" i="1" smtClean="0">
+                      <a:rPr lang="fr-FR" sz="2000" b="1" i="1" smtClean="0">
                         <a:latin typeface="Cambria Math" panose="02040503050406030204" pitchFamily="18" charset="0"/>
                         <a:ea typeface="Cambria Math" panose="02040503050406030204" pitchFamily="18" charset="0"/>
                       </a:rPr>
@@ -6974,14 +6981,14 @@
                     </m:r>
                   </m:oMath>
                 </a14:m>
-                <a:endParaRPr lang="fr-FR" sz="1600" b="1" dirty="0">
+                <a:endParaRPr lang="fr-FR" sz="2000" b="1" dirty="0">
                   <a:latin typeface="Gill Sans MT" panose="020B0502020104020203" pitchFamily="34" charset="0"/>
                 </a:endParaRPr>
               </a:p>
             </p:txBody>
           </p:sp>
         </mc:Choice>
-        <mc:Fallback xmlns="">
+        <mc:Fallback>
           <p:sp>
             <p:nvSpPr>
               <p:cNvPr id="28" name="ZoneTexte 27">
@@ -6998,8 +7005,8 @@
             </p:nvSpPr>
             <p:spPr>
               <a:xfrm>
-                <a:off x="11670670" y="15049817"/>
-                <a:ext cx="4066838" cy="338554"/>
+                <a:off x="11094898" y="14987308"/>
+                <a:ext cx="4920925" cy="400110"/>
               </a:xfrm>
               <a:prstGeom prst="rect">
                 <a:avLst/>
@@ -7007,7 +7014,7 @@
               <a:blipFill>
                 <a:blip r:embed="rId16"/>
                 <a:stretch>
-                  <a:fillRect l="-599" t="-5455" b="-23636"/>
+                  <a:fillRect l="-1115" t="-9231" b="-27692"/>
                 </a:stretch>
               </a:blipFill>
             </p:spPr>
@@ -7040,8 +7047,8 @@
         </p:nvSpPr>
         <p:spPr>
           <a:xfrm>
-            <a:off x="15777989" y="15113212"/>
-            <a:ext cx="878569" cy="251646"/>
+            <a:off x="15954470" y="15081235"/>
+            <a:ext cx="801737" cy="257699"/>
           </a:xfrm>
           <a:prstGeom prst="stripedRightArrow">
             <a:avLst/>
@@ -7092,8 +7099,8 @@
         </p:nvSpPr>
         <p:spPr>
           <a:xfrm>
-            <a:off x="16885608" y="15049817"/>
-            <a:ext cx="4132327" cy="338554"/>
+            <a:off x="16756207" y="15019039"/>
+            <a:ext cx="4702277" cy="400110"/>
           </a:xfrm>
           <a:prstGeom prst="rect">
             <a:avLst/>
@@ -7108,7 +7115,7 @@
           <a:p>
             <a:pPr algn="just"/>
             <a:r>
-              <a:rPr lang="fr-FR" sz="1600" dirty="0">
+              <a:rPr lang="fr-FR" sz="2000" dirty="0">
                 <a:latin typeface="Gill Sans MT" panose="020B0502020104020203" pitchFamily="34" charset="0"/>
               </a:rPr>
               <a:t>Significativité de l’autocorrélation spatiale</a:t>
@@ -7706,8 +7713,8 @@
           </a:p>
         </p:txBody>
       </p:sp>
-      <mc:AlternateContent xmlns:mc="http://schemas.openxmlformats.org/markup-compatibility/2006" xmlns:a14="http://schemas.microsoft.com/office/drawing/2010/main">
-        <mc:Choice Requires="a14">
+      <mc:AlternateContent xmlns:mc="http://schemas.openxmlformats.org/markup-compatibility/2006">
+        <mc:Choice xmlns:a14="http://schemas.microsoft.com/office/drawing/2010/main" Requires="a14">
           <p:sp>
             <p:nvSpPr>
               <p:cNvPr id="39" name="ZoneTexte 38">
@@ -7722,8 +7729,8 @@
             </p:nvSpPr>
             <p:spPr>
               <a:xfrm>
-                <a:off x="16397784" y="18245493"/>
-                <a:ext cx="3872646" cy="584775"/>
+                <a:off x="16334592" y="18181782"/>
+                <a:ext cx="4780895" cy="707886"/>
               </a:xfrm>
               <a:prstGeom prst="rect">
                 <a:avLst/>
@@ -7741,7 +7748,7 @@
                   <a:buChar char="•"/>
                 </a:pPr>
                 <a:r>
-                  <a:rPr lang="fr-FR" sz="1600" dirty="0">
+                  <a:rPr lang="fr-FR" sz="2000" dirty="0">
                     <a:latin typeface="Gill Sans MT" panose="020B0502020104020203" pitchFamily="34" charset="0"/>
                   </a:rPr>
                   <a:t>Coefficient </a:t>
@@ -7749,7 +7756,7 @@
                 <a14:m>
                   <m:oMath xmlns:m="http://schemas.openxmlformats.org/officeDocument/2006/math">
                     <m:r>
-                      <a:rPr lang="fr-FR" sz="1600" i="1" smtClean="0">
+                      <a:rPr lang="fr-FR" sz="2000" i="1" smtClean="0">
                         <a:latin typeface="Cambria Math" panose="02040503050406030204" pitchFamily="18" charset="0"/>
                         <a:ea typeface="Cambria Math" panose="02040503050406030204" pitchFamily="18" charset="0"/>
                       </a:rPr>
@@ -7758,7 +7765,7 @@
                   </m:oMath>
                 </a14:m>
                 <a:r>
-                  <a:rPr lang="fr-FR" sz="1600" dirty="0">
+                  <a:rPr lang="fr-FR" sz="2000" dirty="0">
                     <a:latin typeface="Gill Sans MT" panose="020B0502020104020203" pitchFamily="34" charset="0"/>
                   </a:rPr>
                   <a:t> d’interaction endogène :</a:t>
@@ -7768,35 +7775,35 @@
                 <a14:m>
                   <m:oMath xmlns:m="http://schemas.openxmlformats.org/officeDocument/2006/math">
                     <m:r>
-                      <a:rPr lang="fr-FR" sz="1600" b="1" i="1" smtClean="0">
+                      <a:rPr lang="fr-FR" sz="2000" b="1" i="1" smtClean="0">
                         <a:latin typeface="Cambria Math" panose="02040503050406030204" pitchFamily="18" charset="0"/>
                         <a:ea typeface="Cambria Math" panose="02040503050406030204" pitchFamily="18" charset="0"/>
                       </a:rPr>
                       <m:t>𝝆</m:t>
                     </m:r>
                     <m:r>
-                      <a:rPr lang="fr-FR" sz="1600" b="1" i="1" smtClean="0">
+                      <a:rPr lang="fr-FR" sz="2000" b="1" i="1" smtClean="0">
                         <a:latin typeface="Cambria Math" panose="02040503050406030204" pitchFamily="18" charset="0"/>
                         <a:ea typeface="Cambria Math" panose="02040503050406030204" pitchFamily="18" charset="0"/>
                       </a:rPr>
                       <m:t>=</m:t>
                     </m:r>
                     <m:r>
-                      <a:rPr lang="fr-FR" sz="1600" b="1" i="1" smtClean="0">
+                      <a:rPr lang="fr-FR" sz="2000" b="1" i="1" smtClean="0">
                         <a:latin typeface="Cambria Math" panose="02040503050406030204" pitchFamily="18" charset="0"/>
                         <a:ea typeface="Cambria Math" panose="02040503050406030204" pitchFamily="18" charset="0"/>
                       </a:rPr>
                       <m:t>𝟎</m:t>
                     </m:r>
                     <m:r>
-                      <a:rPr lang="fr-FR" sz="1600" b="1" i="1" smtClean="0">
+                      <a:rPr lang="fr-FR" sz="2000" b="1" i="1" smtClean="0">
                         <a:latin typeface="Cambria Math" panose="02040503050406030204" pitchFamily="18" charset="0"/>
                         <a:ea typeface="Cambria Math" panose="02040503050406030204" pitchFamily="18" charset="0"/>
                       </a:rPr>
                       <m:t>.</m:t>
                     </m:r>
                     <m:r>
-                      <a:rPr lang="fr-FR" sz="1600" b="1" i="1" smtClean="0">
+                      <a:rPr lang="fr-FR" sz="2000" b="1" i="1" smtClean="0">
                         <a:latin typeface="Cambria Math" panose="02040503050406030204" pitchFamily="18" charset="0"/>
                         <a:ea typeface="Cambria Math" panose="02040503050406030204" pitchFamily="18" charset="0"/>
                       </a:rPr>
@@ -7805,20 +7812,24 @@
                   </m:oMath>
                 </a14:m>
                 <a:r>
-                  <a:rPr lang="fr-FR" sz="1600" b="1" dirty="0">
+                  <a:rPr lang="fr-FR" sz="2000" b="1" dirty="0">
                     <a:latin typeface="Gill Sans MT" panose="020B0502020104020203" pitchFamily="34" charset="0"/>
                   </a:rPr>
                   <a:t> </a:t>
                 </a:r>
                 <a:r>
-                  <a:rPr lang="fr-FR" sz="1600" dirty="0">
+                  <a:rPr lang="fr-FR" sz="2000" dirty="0">
                     <a:latin typeface="Gill Sans MT" panose="020B0502020104020203" pitchFamily="34" charset="0"/>
                   </a:rPr>
                   <a:t>(p-valeur</a:t>
                 </a:r>
                 <a:r>
+                  <a:rPr lang="fr-FR" sz="2000" dirty="0"/>
+                  <a:t> &lt; 2.22e-16</a:t>
+                </a:r>
+                <a:r>
                   <a:rPr lang="fr-FR" sz="1600" dirty="0"/>
-                  <a:t> &lt; 2.22e-16)</a:t>
+                  <a:t>)</a:t>
                 </a:r>
                 <a:endParaRPr lang="fr-FR" sz="1600" dirty="0">
                   <a:latin typeface="Gill Sans MT" panose="020B0502020104020203" pitchFamily="34" charset="0"/>
@@ -7827,7 +7838,7 @@
             </p:txBody>
           </p:sp>
         </mc:Choice>
-        <mc:Fallback xmlns="">
+        <mc:Fallback>
           <p:sp>
             <p:nvSpPr>
               <p:cNvPr id="39" name="ZoneTexte 38">
@@ -7844,8 +7855,8 @@
             </p:nvSpPr>
             <p:spPr>
               <a:xfrm>
-                <a:off x="16397784" y="18245493"/>
-                <a:ext cx="3872646" cy="584775"/>
+                <a:off x="16334592" y="18181782"/>
+                <a:ext cx="4780895" cy="707886"/>
               </a:xfrm>
               <a:prstGeom prst="rect">
                 <a:avLst/>
@@ -7853,7 +7864,7 @@
               <a:blipFill>
                 <a:blip r:embed="rId17"/>
                 <a:stretch>
-                  <a:fillRect l="-630" t="-3125" b="-12500"/>
+                  <a:fillRect l="-1148" t="-5172" b="-14655"/>
                 </a:stretch>
               </a:blipFill>
             </p:spPr>
@@ -7886,8 +7897,8 @@
         </p:nvSpPr>
         <p:spPr>
           <a:xfrm rot="5400000">
-            <a:off x="18041718" y="19090020"/>
-            <a:ext cx="584777" cy="181406"/>
+            <a:off x="18100281" y="18916763"/>
+            <a:ext cx="399954" cy="249105"/>
           </a:xfrm>
           <a:prstGeom prst="stripedRightArrow">
             <a:avLst/>
@@ -7938,8 +7949,8 @@
         </p:nvSpPr>
         <p:spPr>
           <a:xfrm>
-            <a:off x="16553562" y="19598325"/>
-            <a:ext cx="4132327" cy="1323439"/>
+            <a:off x="15722327" y="19246655"/>
+            <a:ext cx="4998978" cy="1631216"/>
           </a:xfrm>
           <a:prstGeom prst="rect">
             <a:avLst/>
@@ -7952,9 +7963,9 @@
           </a:bodyPr>
           <a:lstStyle/>
           <a:p>
-            <a:pPr algn="just"/>
-            <a:r>
-              <a:rPr lang="fr-FR" sz="1600" dirty="0">
+            <a:pPr algn="ctr"/>
+            <a:r>
+              <a:rPr lang="fr-FR" sz="2000" dirty="0">
                 <a:latin typeface="Gill Sans MT" panose="020B0502020104020203" pitchFamily="34" charset="0"/>
               </a:rPr>
               <a:t>Très forte autocorrélation spatiale des taux de consultations entre communes : une commune ayant un taux de consultations élevé tend à être entourée par des communes présentant également des taux élevés, et inversement.</a:t>
@@ -7976,8 +7987,8 @@
         </p:nvSpPr>
         <p:spPr>
           <a:xfrm>
-            <a:off x="16465491" y="19561409"/>
-            <a:ext cx="4201327" cy="1415689"/>
+            <a:off x="15554018" y="19241290"/>
+            <a:ext cx="5378770" cy="1648358"/>
           </a:xfrm>
           <a:prstGeom prst="roundRect">
             <a:avLst/>
@@ -8085,8 +8096,8 @@
         </p:nvSpPr>
         <p:spPr>
           <a:xfrm>
-            <a:off x="578978" y="17661665"/>
-            <a:ext cx="6992301" cy="338554"/>
+            <a:off x="314885" y="17613487"/>
+            <a:ext cx="9952841" cy="400110"/>
           </a:xfrm>
           <a:prstGeom prst="rect">
             <a:avLst/>
@@ -8099,19 +8110,13 @@
           </a:bodyPr>
           <a:lstStyle/>
           <a:p>
-            <a:pPr marL="285750" indent="-285750" algn="just">
-              <a:buFont typeface="Arial" panose="020B0604020202020204" pitchFamily="34" charset="0"/>
-              <a:buChar char="•"/>
-            </a:pPr>
-            <a:r>
-              <a:rPr lang="fr-FR" sz="1600" dirty="0">
+            <a:pPr algn="ctr"/>
+            <a:r>
+              <a:rPr lang="fr-FR" sz="2000" b="1" dirty="0">
                 <a:latin typeface="Gill Sans MT" panose="020B0502020104020203" pitchFamily="34" charset="0"/>
               </a:rPr>
               <a:t>Approche d’ELHORST, 2010 pour le choix d’un modèle d’économétrie spatiale</a:t>
             </a:r>
-            <a:endParaRPr lang="fr-FR" sz="1600" b="1" dirty="0">
-              <a:latin typeface="Gill Sans MT" panose="020B0502020104020203" pitchFamily="34" charset="0"/>
-            </a:endParaRPr>
           </a:p>
         </p:txBody>
       </p:sp>
@@ -8379,8 +8384,8 @@
         </p:nvSpPr>
         <p:spPr>
           <a:xfrm>
-            <a:off x="607713" y="22652589"/>
-            <a:ext cx="6992301" cy="338554"/>
+            <a:off x="1974572" y="22641741"/>
+            <a:ext cx="6992301" cy="400110"/>
           </a:xfrm>
           <a:prstGeom prst="rect">
             <a:avLst/>
@@ -8393,19 +8398,13 @@
           </a:bodyPr>
           <a:lstStyle/>
           <a:p>
-            <a:pPr marL="285750" indent="-285750" algn="just">
-              <a:buFont typeface="Arial" panose="020B0604020202020204" pitchFamily="34" charset="0"/>
-              <a:buChar char="•"/>
-            </a:pPr>
-            <a:r>
-              <a:rPr lang="fr-FR" sz="1600" dirty="0">
+            <a:pPr algn="ctr"/>
+            <a:r>
+              <a:rPr lang="fr-FR" sz="2000" b="1" dirty="0">
                 <a:latin typeface="Gill Sans MT" panose="020B0502020104020203" pitchFamily="34" charset="0"/>
               </a:rPr>
               <a:t>Outils utilisés</a:t>
             </a:r>
-            <a:endParaRPr lang="fr-FR" sz="1600" b="1" dirty="0">
-              <a:latin typeface="Gill Sans MT" panose="020B0502020104020203" pitchFamily="34" charset="0"/>
-            </a:endParaRPr>
           </a:p>
         </p:txBody>
       </p:sp>
@@ -8630,8 +8629,8 @@
         </p:nvSpPr>
         <p:spPr bwMode="auto">
           <a:xfrm>
-            <a:off x="877826" y="26967884"/>
-            <a:ext cx="19788991" cy="1938992"/>
+            <a:off x="707599" y="26787121"/>
+            <a:ext cx="19968413" cy="1938992"/>
           </a:xfrm>
           <a:prstGeom prst="rect">
             <a:avLst/>
@@ -8679,7 +8678,7 @@
           </a:bodyPr>
           <a:lstStyle/>
           <a:p>
-            <a:pPr marL="0" marR="0" lvl="0" indent="0" algn="just" defTabSz="914400" rtl="0" eaLnBrk="0" fontAlgn="base" latinLnBrk="0" hangingPunct="0">
+            <a:pPr marL="0" marR="0" lvl="0" indent="0" algn="ctr" defTabSz="914400" rtl="0" eaLnBrk="0" fontAlgn="base" latinLnBrk="0" hangingPunct="0">
               <a:lnSpc>
                 <a:spcPct val="100000"/>
               </a:lnSpc>

</xml_diff>

<commit_message>
Correction des erreurs grammaticales et mise en alignement justifié des paragraphes
</commit_message>
<xml_diff>
--- a/Présentation/MODELISATION-DU-NOMBRE-DE-VISITES.pptx
+++ b/Présentation/MODELISATION-DU-NOMBRE-DE-VISITES.pptx
@@ -197,7 +197,7 @@
           <a:p>
             <a:fld id="{685D38A0-6625-420E-984B-5040EA439569}" type="datetimeFigureOut">
               <a:rPr lang="fr-FR" smtClean="0"/>
-              <a:t>09/04/2025</a:t>
+              <a:t>10/04/2025</a:t>
             </a:fld>
             <a:endParaRPr lang="fr-FR"/>
           </a:p>
@@ -684,7 +684,7 @@
           <a:p>
             <a:fld id="{A9C50A28-6A05-4D1F-9987-845550122DAD}" type="datetimeFigureOut">
               <a:rPr lang="fr-FR" smtClean="0"/>
-              <a:t>09/04/2025</a:t>
+              <a:t>10/04/2025</a:t>
             </a:fld>
             <a:endParaRPr lang="fr-FR"/>
           </a:p>
@@ -854,7 +854,7 @@
           <a:p>
             <a:fld id="{A9C50A28-6A05-4D1F-9987-845550122DAD}" type="datetimeFigureOut">
               <a:rPr lang="fr-FR" smtClean="0"/>
-              <a:t>09/04/2025</a:t>
+              <a:t>10/04/2025</a:t>
             </a:fld>
             <a:endParaRPr lang="fr-FR"/>
           </a:p>
@@ -1034,7 +1034,7 @@
           <a:p>
             <a:fld id="{A9C50A28-6A05-4D1F-9987-845550122DAD}" type="datetimeFigureOut">
               <a:rPr lang="fr-FR" smtClean="0"/>
-              <a:t>09/04/2025</a:t>
+              <a:t>10/04/2025</a:t>
             </a:fld>
             <a:endParaRPr lang="fr-FR"/>
           </a:p>
@@ -1204,7 +1204,7 @@
           <a:p>
             <a:fld id="{A9C50A28-6A05-4D1F-9987-845550122DAD}" type="datetimeFigureOut">
               <a:rPr lang="fr-FR" smtClean="0"/>
-              <a:t>09/04/2025</a:t>
+              <a:t>10/04/2025</a:t>
             </a:fld>
             <a:endParaRPr lang="fr-FR"/>
           </a:p>
@@ -1448,7 +1448,7 @@
           <a:p>
             <a:fld id="{A9C50A28-6A05-4D1F-9987-845550122DAD}" type="datetimeFigureOut">
               <a:rPr lang="fr-FR" smtClean="0"/>
-              <a:t>09/04/2025</a:t>
+              <a:t>10/04/2025</a:t>
             </a:fld>
             <a:endParaRPr lang="fr-FR"/>
           </a:p>
@@ -1680,7 +1680,7 @@
           <a:p>
             <a:fld id="{A9C50A28-6A05-4D1F-9987-845550122DAD}" type="datetimeFigureOut">
               <a:rPr lang="fr-FR" smtClean="0"/>
-              <a:t>09/04/2025</a:t>
+              <a:t>10/04/2025</a:t>
             </a:fld>
             <a:endParaRPr lang="fr-FR"/>
           </a:p>
@@ -2047,7 +2047,7 @@
           <a:p>
             <a:fld id="{A9C50A28-6A05-4D1F-9987-845550122DAD}" type="datetimeFigureOut">
               <a:rPr lang="fr-FR" smtClean="0"/>
-              <a:t>09/04/2025</a:t>
+              <a:t>10/04/2025</a:t>
             </a:fld>
             <a:endParaRPr lang="fr-FR"/>
           </a:p>
@@ -2165,7 +2165,7 @@
           <a:p>
             <a:fld id="{A9C50A28-6A05-4D1F-9987-845550122DAD}" type="datetimeFigureOut">
               <a:rPr lang="fr-FR" smtClean="0"/>
-              <a:t>09/04/2025</a:t>
+              <a:t>10/04/2025</a:t>
             </a:fld>
             <a:endParaRPr lang="fr-FR"/>
           </a:p>
@@ -2260,7 +2260,7 @@
           <a:p>
             <a:fld id="{A9C50A28-6A05-4D1F-9987-845550122DAD}" type="datetimeFigureOut">
               <a:rPr lang="fr-FR" smtClean="0"/>
-              <a:t>09/04/2025</a:t>
+              <a:t>10/04/2025</a:t>
             </a:fld>
             <a:endParaRPr lang="fr-FR"/>
           </a:p>
@@ -2537,7 +2537,7 @@
           <a:p>
             <a:fld id="{A9C50A28-6A05-4D1F-9987-845550122DAD}" type="datetimeFigureOut">
               <a:rPr lang="fr-FR" smtClean="0"/>
-              <a:t>09/04/2025</a:t>
+              <a:t>10/04/2025</a:t>
             </a:fld>
             <a:endParaRPr lang="fr-FR"/>
           </a:p>
@@ -2794,7 +2794,7 @@
           <a:p>
             <a:fld id="{A9C50A28-6A05-4D1F-9987-845550122DAD}" type="datetimeFigureOut">
               <a:rPr lang="fr-FR" smtClean="0"/>
-              <a:t>09/04/2025</a:t>
+              <a:t>10/04/2025</a:t>
             </a:fld>
             <a:endParaRPr lang="fr-FR"/>
           </a:p>
@@ -3013,7 +3013,7 @@
           <a:p>
             <a:fld id="{A9C50A28-6A05-4D1F-9987-845550122DAD}" type="datetimeFigureOut">
               <a:rPr lang="fr-FR" smtClean="0"/>
-              <a:t>09/04/2025</a:t>
+              <a:t>10/04/2025</a:t>
             </a:fld>
             <a:endParaRPr lang="fr-FR"/>
           </a:p>
@@ -3846,7 +3846,7 @@
             </a:r>
           </a:p>
           <a:p>
-            <a:pPr marL="285750" indent="-285750" algn="ctr">
+            <a:pPr marL="285750" indent="-285750" algn="just">
               <a:buFont typeface="Arial" panose="020B0604020202020204" pitchFamily="34" charset="0"/>
               <a:buChar char="•"/>
             </a:pPr>
@@ -3861,7 +3861,7 @@
             </a:r>
           </a:p>
           <a:p>
-            <a:pPr marL="285750" indent="-285750" algn="ctr">
+            <a:pPr marL="285750" indent="-285750" algn="just">
               <a:buFont typeface="Arial" panose="020B0604020202020204" pitchFamily="34" charset="0"/>
               <a:buChar char="•"/>
             </a:pPr>
@@ -3876,7 +3876,7 @@
             </a:r>
           </a:p>
           <a:p>
-            <a:pPr marL="285750" indent="-285750" algn="ctr">
+            <a:pPr marL="285750" indent="-285750" algn="just">
               <a:buFont typeface="Arial" panose="020B0604020202020204" pitchFamily="34" charset="0"/>
               <a:buChar char="•"/>
             </a:pPr>
@@ -4121,19 +4121,7 @@
               <a:rPr lang="fr-FR" sz="2000" dirty="0">
                 <a:latin typeface="Gill Sans MT" panose="020B0502020104020203" pitchFamily="34" charset="0"/>
               </a:rPr>
-              <a:t> :  Ali Nour </a:t>
-            </a:r>
-            <a:r>
-              <a:rPr lang="fr-FR" sz="2000" dirty="0" err="1">
-                <a:latin typeface="Gill Sans MT" panose="020B0502020104020203" pitchFamily="34" charset="0"/>
-              </a:rPr>
-              <a:t>Guedemi</a:t>
-            </a:r>
-            <a:r>
-              <a:rPr lang="fr-FR" sz="2000" dirty="0">
-                <a:latin typeface="Gill Sans MT" panose="020B0502020104020203" pitchFamily="34" charset="0"/>
-              </a:rPr>
-              <a:t> ABDELWAHID,  Toussaint BOCO, Komi </a:t>
+              <a:t> :  Ali Nour Guedemi ABDELWAHID,  Toussaint BOCO, Komi </a:t>
             </a:r>
             <a:r>
               <a:rPr lang="fr-FR" sz="2000" dirty="0" err="1">
@@ -4157,7 +4145,7 @@
               <a:rPr lang="fr-FR" sz="2000" dirty="0">
                 <a:latin typeface="Gill Sans MT" panose="020B0502020104020203" pitchFamily="34" charset="0"/>
               </a:rPr>
-              <a:t> Alex LABOU,</a:t>
+              <a:t> Alex LABOU</a:t>
             </a:r>
           </a:p>
           <a:p>
@@ -4299,7 +4287,7 @@
             </a:r>
           </a:p>
           <a:p>
-            <a:pPr algn="ctr"/>
+            <a:pPr algn="just"/>
             <a:r>
               <a:rPr lang="fr-FR" sz="2400" dirty="0">
                 <a:solidFill>
@@ -4377,7 +4365,7 @@
         <p:spPr>
           <a:xfrm>
             <a:off x="11171505" y="18607300"/>
-            <a:ext cx="4314337" cy="2483071"/>
+            <a:ext cx="4574017" cy="2483071"/>
           </a:xfrm>
           <a:prstGeom prst="rect">
             <a:avLst/>
@@ -4451,7 +4439,7 @@
             </a:r>
           </a:p>
           <a:p>
-            <a:pPr algn="ctr"/>
+            <a:pPr algn="just"/>
             <a:r>
               <a:rPr lang="fr-FR" sz="2400" dirty="0">
                 <a:solidFill>
@@ -4701,7 +4689,7 @@
         </p:blipFill>
         <p:spPr>
           <a:xfrm>
-            <a:off x="11840012" y="9246024"/>
+            <a:off x="11974762" y="9118224"/>
             <a:ext cx="2977324" cy="1969115"/>
           </a:xfrm>
           <a:prstGeom prst="rect">
@@ -4740,7 +4728,7 @@
         </p:blipFill>
         <p:spPr>
           <a:xfrm>
-            <a:off x="17086358" y="9107487"/>
+            <a:off x="17086358" y="9082087"/>
             <a:ext cx="2844277" cy="1969115"/>
           </a:xfrm>
           <a:prstGeom prst="rect">
@@ -5149,7 +5137,7 @@
         </p:nvSpPr>
         <p:spPr>
           <a:xfrm>
-            <a:off x="6381944" y="25873396"/>
+            <a:off x="7055044" y="25873396"/>
             <a:ext cx="7432182" cy="535722"/>
           </a:xfrm>
           <a:prstGeom prst="roundRect">
@@ -5319,7 +5307,7 @@
           </a:bodyPr>
           <a:lstStyle/>
           <a:p>
-            <a:pPr algn="ctr"/>
+            <a:pPr algn="just"/>
             <a:r>
               <a:rPr lang="fr-FR" dirty="0">
                 <a:latin typeface="Gill Sans MT" panose="020B0502020104020203" pitchFamily="34" charset="0"/>
@@ -5357,7 +5345,7 @@
           </a:bodyPr>
           <a:lstStyle/>
           <a:p>
-            <a:pPr algn="ctr"/>
+            <a:pPr algn="just"/>
             <a:r>
               <a:rPr lang="fr-FR" dirty="0">
                 <a:latin typeface="Gill Sans MT" panose="020B0502020104020203" pitchFamily="34" charset="0"/>
@@ -5381,7 +5369,7 @@
         </p:nvSpPr>
         <p:spPr>
           <a:xfrm>
-            <a:off x="11431215" y="11135902"/>
+            <a:off x="11421590" y="10967327"/>
             <a:ext cx="4150553" cy="1754326"/>
           </a:xfrm>
           <a:prstGeom prst="rect">
@@ -5395,7 +5383,7 @@
           </a:bodyPr>
           <a:lstStyle/>
           <a:p>
-            <a:pPr algn="ctr"/>
+            <a:pPr algn="just"/>
             <a:r>
               <a:rPr lang="fr-FR" dirty="0">
                 <a:latin typeface="Gill Sans MT" panose="020B0502020104020203" pitchFamily="34" charset="0"/>
@@ -5419,7 +5407,7 @@
         </p:nvSpPr>
         <p:spPr>
           <a:xfrm>
-            <a:off x="16636421" y="11081964"/>
+            <a:off x="16636421" y="11043864"/>
             <a:ext cx="3856711" cy="1754326"/>
           </a:xfrm>
           <a:prstGeom prst="rect">
@@ -5433,7 +5421,7 @@
           </a:bodyPr>
           <a:lstStyle/>
           <a:p>
-            <a:pPr algn="ctr">
+            <a:pPr algn="just">
               <a:buNone/>
             </a:pPr>
             <a:r>
@@ -5964,552 +5952,6 @@
           </p:sp>
         </mc:Fallback>
       </mc:AlternateContent>
-      <mc:AlternateContent xmlns:mc="http://schemas.openxmlformats.org/markup-compatibility/2006" xmlns:a14="http://schemas.microsoft.com/office/drawing/2010/main">
-        <mc:Choice Requires="a14">
-          <p:sp>
-            <p:nvSpPr>
-              <p:cNvPr id="15" name="ZoneTexte 14">
-                <a:extLst>
-                  <a:ext uri="{FF2B5EF4-FFF2-40B4-BE49-F238E27FC236}">
-                    <a16:creationId xmlns:a16="http://schemas.microsoft.com/office/drawing/2014/main" id="{C3B1FC5B-052E-6DDE-9DB3-DC96022BC6A3}"/>
-                  </a:ext>
-                </a:extLst>
-              </p:cNvPr>
-              <p:cNvSpPr txBox="1"/>
-              <p:nvPr/>
-            </p:nvSpPr>
-            <p:spPr>
-              <a:xfrm>
-                <a:off x="6202024" y="14869169"/>
-                <a:ext cx="4053566" cy="838435"/>
-              </a:xfrm>
-              <a:prstGeom prst="rect">
-                <a:avLst/>
-              </a:prstGeom>
-              <a:noFill/>
-              <a:ln w="28575">
-                <a:solidFill>
-                  <a:srgbClr val="002060"/>
-                </a:solidFill>
-              </a:ln>
-            </p:spPr>
-            <p:txBody>
-              <a:bodyPr wrap="square" rtlCol="0">
-                <a:spAutoFit/>
-              </a:bodyPr>
-              <a:lstStyle/>
-              <a:p>
-                <a:pPr algn="ctr"/>
-                <a:r>
-                  <a:rPr lang="fr-FR" sz="1400" b="1" dirty="0">
-                    <a:latin typeface="Gill Sans MT" panose="020B0502020104020203" pitchFamily="34" charset="0"/>
-                  </a:rPr>
-                  <a:t>Indice de Moran</a:t>
-                </a:r>
-              </a:p>
-              <a:p>
-                <a:pPr algn="ctr"/>
-                <a14:m>
-                  <m:oMathPara xmlns:m="http://schemas.openxmlformats.org/officeDocument/2006/math">
-                    <m:oMathParaPr>
-                      <m:jc m:val="centerGroup"/>
-                    </m:oMathParaPr>
-                    <m:oMath xmlns:m="http://schemas.openxmlformats.org/officeDocument/2006/math">
-                      <m:r>
-                        <a:rPr lang="fr-FR" sz="1400" b="0" i="1" smtClean="0">
-                          <a:latin typeface="Cambria Math" panose="02040503050406030204" pitchFamily="18" charset="0"/>
-                        </a:rPr>
-                        <m:t>𝐼</m:t>
-                      </m:r>
-                      <m:r>
-                        <a:rPr lang="fr-FR" sz="1400" b="0" i="1" smtClean="0">
-                          <a:latin typeface="Cambria Math" panose="02040503050406030204" pitchFamily="18" charset="0"/>
-                        </a:rPr>
-                        <m:t>=</m:t>
-                      </m:r>
-                      <m:f>
-                        <m:fPr>
-                          <m:ctrlPr>
-                            <a:rPr lang="fr-FR" sz="1400" b="0" i="1" smtClean="0">
-                              <a:latin typeface="Cambria Math" panose="02040503050406030204" pitchFamily="18" charset="0"/>
-                            </a:rPr>
-                          </m:ctrlPr>
-                        </m:fPr>
-                        <m:num>
-                          <m:r>
-                            <a:rPr lang="fr-FR" sz="1400" b="0" i="1" smtClean="0">
-                              <a:latin typeface="Cambria Math" panose="02040503050406030204" pitchFamily="18" charset="0"/>
-                            </a:rPr>
-                            <m:t>𝑁</m:t>
-                          </m:r>
-                        </m:num>
-                        <m:den>
-                          <m:nary>
-                            <m:naryPr>
-                              <m:chr m:val="∑"/>
-                              <m:limLoc m:val="subSup"/>
-                              <m:supHide m:val="on"/>
-                              <m:ctrlPr>
-                                <a:rPr lang="fr-FR" sz="1400" b="0" i="1" smtClean="0">
-                                  <a:latin typeface="Cambria Math" panose="02040503050406030204" pitchFamily="18" charset="0"/>
-                                </a:rPr>
-                              </m:ctrlPr>
-                            </m:naryPr>
-                            <m:sub>
-                              <m:r>
-                                <m:rPr>
-                                  <m:brk m:alnAt="9"/>
-                                </m:rPr>
-                                <a:rPr lang="fr-FR" sz="1400" b="0" i="1" smtClean="0">
-                                  <a:latin typeface="Cambria Math" panose="02040503050406030204" pitchFamily="18" charset="0"/>
-                                </a:rPr>
-                                <m:t>𝑖</m:t>
-                              </m:r>
-                            </m:sub>
-                            <m:sup/>
-                            <m:e>
-                              <m:nary>
-                                <m:naryPr>
-                                  <m:chr m:val="∑"/>
-                                  <m:limLoc m:val="subSup"/>
-                                  <m:supHide m:val="on"/>
-                                  <m:ctrlPr>
-                                    <a:rPr lang="fr-FR" sz="1400" b="0" i="1" smtClean="0">
-                                      <a:latin typeface="Cambria Math" panose="02040503050406030204" pitchFamily="18" charset="0"/>
-                                    </a:rPr>
-                                  </m:ctrlPr>
-                                </m:naryPr>
-                                <m:sub>
-                                  <m:r>
-                                    <m:rPr>
-                                      <m:brk m:alnAt="9"/>
-                                    </m:rPr>
-                                    <a:rPr lang="fr-FR" sz="1400" b="0" i="1" smtClean="0">
-                                      <a:latin typeface="Cambria Math" panose="02040503050406030204" pitchFamily="18" charset="0"/>
-                                    </a:rPr>
-                                    <m:t>𝑗</m:t>
-                                  </m:r>
-                                </m:sub>
-                                <m:sup/>
-                                <m:e>
-                                  <m:sSub>
-                                    <m:sSubPr>
-                                      <m:ctrlPr>
-                                        <a:rPr lang="fr-FR" sz="1400" b="0" i="1" smtClean="0">
-                                          <a:latin typeface="Cambria Math" panose="02040503050406030204" pitchFamily="18" charset="0"/>
-                                        </a:rPr>
-                                      </m:ctrlPr>
-                                    </m:sSubPr>
-                                    <m:e>
-                                      <m:r>
-                                        <a:rPr lang="fr-FR" sz="1400" b="0" i="1" smtClean="0">
-                                          <a:latin typeface="Cambria Math" panose="02040503050406030204" pitchFamily="18" charset="0"/>
-                                        </a:rPr>
-                                        <m:t>𝑊</m:t>
-                                      </m:r>
-                                    </m:e>
-                                    <m:sub>
-                                      <m:r>
-                                        <a:rPr lang="fr-FR" sz="1400" b="0" i="1" smtClean="0">
-                                          <a:latin typeface="Cambria Math" panose="02040503050406030204" pitchFamily="18" charset="0"/>
-                                        </a:rPr>
-                                        <m:t>𝑖𝑗</m:t>
-                                      </m:r>
-                                    </m:sub>
-                                  </m:sSub>
-                                </m:e>
-                              </m:nary>
-                            </m:e>
-                          </m:nary>
-                        </m:den>
-                      </m:f>
-                      <m:r>
-                        <a:rPr lang="fr-FR" sz="1400" b="0" i="1" smtClean="0">
-                          <a:latin typeface="Cambria Math" panose="02040503050406030204" pitchFamily="18" charset="0"/>
-                          <a:ea typeface="Cambria Math" panose="02040503050406030204" pitchFamily="18" charset="0"/>
-                        </a:rPr>
-                        <m:t>∙</m:t>
-                      </m:r>
-                      <m:f>
-                        <m:fPr>
-                          <m:ctrlPr>
-                            <a:rPr lang="fr-FR" sz="1400" b="0" i="1" smtClean="0">
-                              <a:latin typeface="Cambria Math" panose="02040503050406030204" pitchFamily="18" charset="0"/>
-                              <a:ea typeface="Cambria Math" panose="02040503050406030204" pitchFamily="18" charset="0"/>
-                            </a:rPr>
-                          </m:ctrlPr>
-                        </m:fPr>
-                        <m:num>
-                          <m:nary>
-                            <m:naryPr>
-                              <m:chr m:val="∑"/>
-                              <m:limLoc m:val="subSup"/>
-                              <m:supHide m:val="on"/>
-                              <m:ctrlPr>
-                                <a:rPr lang="fr-FR" sz="1400" i="1">
-                                  <a:latin typeface="Cambria Math" panose="02040503050406030204" pitchFamily="18" charset="0"/>
-                                </a:rPr>
-                              </m:ctrlPr>
-                            </m:naryPr>
-                            <m:sub>
-                              <m:r>
-                                <m:rPr>
-                                  <m:brk m:alnAt="9"/>
-                                </m:rPr>
-                                <a:rPr lang="fr-FR" sz="1400" i="1">
-                                  <a:latin typeface="Cambria Math" panose="02040503050406030204" pitchFamily="18" charset="0"/>
-                                </a:rPr>
-                                <m:t>𝑖</m:t>
-                              </m:r>
-                            </m:sub>
-                            <m:sup/>
-                            <m:e>
-                              <m:nary>
-                                <m:naryPr>
-                                  <m:chr m:val="∑"/>
-                                  <m:limLoc m:val="subSup"/>
-                                  <m:supHide m:val="on"/>
-                                  <m:ctrlPr>
-                                    <a:rPr lang="fr-FR" sz="1400" i="1">
-                                      <a:latin typeface="Cambria Math" panose="02040503050406030204" pitchFamily="18" charset="0"/>
-                                    </a:rPr>
-                                  </m:ctrlPr>
-                                </m:naryPr>
-                                <m:sub>
-                                  <m:r>
-                                    <m:rPr>
-                                      <m:brk m:alnAt="9"/>
-                                    </m:rPr>
-                                    <a:rPr lang="fr-FR" sz="1400" i="1">
-                                      <a:latin typeface="Cambria Math" panose="02040503050406030204" pitchFamily="18" charset="0"/>
-                                    </a:rPr>
-                                    <m:t>𝑗</m:t>
-                                  </m:r>
-                                </m:sub>
-                                <m:sup/>
-                                <m:e>
-                                  <m:sSub>
-                                    <m:sSubPr>
-                                      <m:ctrlPr>
-                                        <a:rPr lang="fr-FR" sz="1400" i="1">
-                                          <a:latin typeface="Cambria Math" panose="02040503050406030204" pitchFamily="18" charset="0"/>
-                                        </a:rPr>
-                                      </m:ctrlPr>
-                                    </m:sSubPr>
-                                    <m:e>
-                                      <m:r>
-                                        <a:rPr lang="fr-FR" sz="1400" i="1">
-                                          <a:latin typeface="Cambria Math" panose="02040503050406030204" pitchFamily="18" charset="0"/>
-                                        </a:rPr>
-                                        <m:t>𝑊</m:t>
-                                      </m:r>
-                                    </m:e>
-                                    <m:sub>
-                                      <m:r>
-                                        <a:rPr lang="fr-FR" sz="1400" i="1">
-                                          <a:latin typeface="Cambria Math" panose="02040503050406030204" pitchFamily="18" charset="0"/>
-                                        </a:rPr>
-                                        <m:t>𝑖𝑗</m:t>
-                                      </m:r>
-                                    </m:sub>
-                                  </m:sSub>
-                                </m:e>
-                              </m:nary>
-                            </m:e>
-                          </m:nary>
-                          <m:d>
-                            <m:dPr>
-                              <m:ctrlPr>
-                                <a:rPr lang="fr-FR" sz="1400" i="1" smtClean="0">
-                                  <a:latin typeface="Cambria Math" panose="02040503050406030204" pitchFamily="18" charset="0"/>
-                                </a:rPr>
-                              </m:ctrlPr>
-                            </m:dPr>
-                            <m:e>
-                              <m:sSub>
-                                <m:sSubPr>
-                                  <m:ctrlPr>
-                                    <a:rPr lang="fr-FR" sz="1400" i="1" smtClean="0">
-                                      <a:latin typeface="Cambria Math" panose="02040503050406030204" pitchFamily="18" charset="0"/>
-                                    </a:rPr>
-                                  </m:ctrlPr>
-                                </m:sSubPr>
-                                <m:e>
-                                  <m:r>
-                                    <a:rPr lang="fr-FR" sz="1400" b="0" i="1" smtClean="0">
-                                      <a:latin typeface="Cambria Math" panose="02040503050406030204" pitchFamily="18" charset="0"/>
-                                    </a:rPr>
-                                    <m:t>𝑦</m:t>
-                                  </m:r>
-                                </m:e>
-                                <m:sub>
-                                  <m:r>
-                                    <a:rPr lang="fr-FR" sz="1400" b="0" i="1" smtClean="0">
-                                      <a:latin typeface="Cambria Math" panose="02040503050406030204" pitchFamily="18" charset="0"/>
-                                    </a:rPr>
-                                    <m:t>𝑖</m:t>
-                                  </m:r>
-                                </m:sub>
-                              </m:sSub>
-                              <m:r>
-                                <a:rPr lang="fr-FR" sz="1400" b="0" i="1" smtClean="0">
-                                  <a:latin typeface="Cambria Math" panose="02040503050406030204" pitchFamily="18" charset="0"/>
-                                </a:rPr>
-                                <m:t>−</m:t>
-                              </m:r>
-                              <m:acc>
-                                <m:accPr>
-                                  <m:chr m:val="̅"/>
-                                  <m:ctrlPr>
-                                    <a:rPr lang="fr-FR" sz="1400" b="0" i="1" smtClean="0">
-                                      <a:latin typeface="Cambria Math" panose="02040503050406030204" pitchFamily="18" charset="0"/>
-                                    </a:rPr>
-                                  </m:ctrlPr>
-                                </m:accPr>
-                                <m:e>
-                                  <m:r>
-                                    <a:rPr lang="fr-FR" sz="1400" b="0" i="1" smtClean="0">
-                                      <a:latin typeface="Cambria Math" panose="02040503050406030204" pitchFamily="18" charset="0"/>
-                                    </a:rPr>
-                                    <m:t>𝑦</m:t>
-                                  </m:r>
-                                </m:e>
-                              </m:acc>
-                            </m:e>
-                          </m:d>
-                          <m:d>
-                            <m:dPr>
-                              <m:ctrlPr>
-                                <a:rPr lang="fr-FR" sz="1400" i="1">
-                                  <a:latin typeface="Cambria Math" panose="02040503050406030204" pitchFamily="18" charset="0"/>
-                                </a:rPr>
-                              </m:ctrlPr>
-                            </m:dPr>
-                            <m:e>
-                              <m:sSub>
-                                <m:sSubPr>
-                                  <m:ctrlPr>
-                                    <a:rPr lang="fr-FR" sz="1400" i="1">
-                                      <a:latin typeface="Cambria Math" panose="02040503050406030204" pitchFamily="18" charset="0"/>
-                                    </a:rPr>
-                                  </m:ctrlPr>
-                                </m:sSubPr>
-                                <m:e>
-                                  <m:r>
-                                    <a:rPr lang="fr-FR" sz="1400" i="1">
-                                      <a:latin typeface="Cambria Math" panose="02040503050406030204" pitchFamily="18" charset="0"/>
-                                    </a:rPr>
-                                    <m:t>𝑦</m:t>
-                                  </m:r>
-                                </m:e>
-                                <m:sub>
-                                  <m:r>
-                                    <a:rPr lang="fr-FR" sz="1400" b="0" i="1" smtClean="0">
-                                      <a:latin typeface="Cambria Math" panose="02040503050406030204" pitchFamily="18" charset="0"/>
-                                    </a:rPr>
-                                    <m:t>𝑗</m:t>
-                                  </m:r>
-                                </m:sub>
-                              </m:sSub>
-                              <m:r>
-                                <a:rPr lang="fr-FR" sz="1400" i="1">
-                                  <a:latin typeface="Cambria Math" panose="02040503050406030204" pitchFamily="18" charset="0"/>
-                                </a:rPr>
-                                <m:t>−</m:t>
-                              </m:r>
-                              <m:acc>
-                                <m:accPr>
-                                  <m:chr m:val="̅"/>
-                                  <m:ctrlPr>
-                                    <a:rPr lang="fr-FR" sz="1400" i="1">
-                                      <a:latin typeface="Cambria Math" panose="02040503050406030204" pitchFamily="18" charset="0"/>
-                                    </a:rPr>
-                                  </m:ctrlPr>
-                                </m:accPr>
-                                <m:e>
-                                  <m:r>
-                                    <a:rPr lang="fr-FR" sz="1400" i="1">
-                                      <a:latin typeface="Cambria Math" panose="02040503050406030204" pitchFamily="18" charset="0"/>
-                                    </a:rPr>
-                                    <m:t>𝑦</m:t>
-                                  </m:r>
-                                </m:e>
-                              </m:acc>
-                            </m:e>
-                          </m:d>
-                        </m:num>
-                        <m:den>
-                          <m:nary>
-                            <m:naryPr>
-                              <m:chr m:val="∑"/>
-                              <m:limLoc m:val="subSup"/>
-                              <m:supHide m:val="on"/>
-                              <m:ctrlPr>
-                                <a:rPr lang="fr-FR" sz="1400" b="0" i="1" smtClean="0">
-                                  <a:latin typeface="Cambria Math" panose="02040503050406030204" pitchFamily="18" charset="0"/>
-                                  <a:ea typeface="Cambria Math" panose="02040503050406030204" pitchFamily="18" charset="0"/>
-                                </a:rPr>
-                              </m:ctrlPr>
-                            </m:naryPr>
-                            <m:sub>
-                              <m:r>
-                                <m:rPr>
-                                  <m:brk m:alnAt="9"/>
-                                </m:rPr>
-                                <a:rPr lang="fr-FR" sz="1400" b="0" i="1" smtClean="0">
-                                  <a:latin typeface="Cambria Math" panose="02040503050406030204" pitchFamily="18" charset="0"/>
-                                  <a:ea typeface="Cambria Math" panose="02040503050406030204" pitchFamily="18" charset="0"/>
-                                </a:rPr>
-                                <m:t>𝑖</m:t>
-                              </m:r>
-                            </m:sub>
-                            <m:sup/>
-                            <m:e>
-                              <m:sSup>
-                                <m:sSupPr>
-                                  <m:ctrlPr>
-                                    <a:rPr lang="fr-FR" sz="1400" b="0" i="1" smtClean="0">
-                                      <a:latin typeface="Cambria Math" panose="02040503050406030204" pitchFamily="18" charset="0"/>
-                                      <a:ea typeface="Cambria Math" panose="02040503050406030204" pitchFamily="18" charset="0"/>
-                                    </a:rPr>
-                                  </m:ctrlPr>
-                                </m:sSupPr>
-                                <m:e>
-                                  <m:d>
-                                    <m:dPr>
-                                      <m:ctrlPr>
-                                        <a:rPr lang="fr-FR" sz="1400" i="1">
-                                          <a:latin typeface="Cambria Math" panose="02040503050406030204" pitchFamily="18" charset="0"/>
-                                        </a:rPr>
-                                      </m:ctrlPr>
-                                    </m:dPr>
-                                    <m:e>
-                                      <m:sSub>
-                                        <m:sSubPr>
-                                          <m:ctrlPr>
-                                            <a:rPr lang="fr-FR" sz="1400" i="1">
-                                              <a:latin typeface="Cambria Math" panose="02040503050406030204" pitchFamily="18" charset="0"/>
-                                            </a:rPr>
-                                          </m:ctrlPr>
-                                        </m:sSubPr>
-                                        <m:e>
-                                          <m:r>
-                                            <a:rPr lang="fr-FR" sz="1400" i="1">
-                                              <a:latin typeface="Cambria Math" panose="02040503050406030204" pitchFamily="18" charset="0"/>
-                                            </a:rPr>
-                                            <m:t>𝑦</m:t>
-                                          </m:r>
-                                        </m:e>
-                                        <m:sub>
-                                          <m:r>
-                                            <a:rPr lang="fr-FR" sz="1400" i="1">
-                                              <a:latin typeface="Cambria Math" panose="02040503050406030204" pitchFamily="18" charset="0"/>
-                                            </a:rPr>
-                                            <m:t>𝑖</m:t>
-                                          </m:r>
-                                        </m:sub>
-                                      </m:sSub>
-                                      <m:r>
-                                        <a:rPr lang="fr-FR" sz="1400" i="1">
-                                          <a:latin typeface="Cambria Math" panose="02040503050406030204" pitchFamily="18" charset="0"/>
-                                        </a:rPr>
-                                        <m:t>−</m:t>
-                                      </m:r>
-                                      <m:acc>
-                                        <m:accPr>
-                                          <m:chr m:val="̅"/>
-                                          <m:ctrlPr>
-                                            <a:rPr lang="fr-FR" sz="1400" i="1">
-                                              <a:latin typeface="Cambria Math" panose="02040503050406030204" pitchFamily="18" charset="0"/>
-                                            </a:rPr>
-                                          </m:ctrlPr>
-                                        </m:accPr>
-                                        <m:e>
-                                          <m:r>
-                                            <a:rPr lang="fr-FR" sz="1400" i="1">
-                                              <a:latin typeface="Cambria Math" panose="02040503050406030204" pitchFamily="18" charset="0"/>
-                                            </a:rPr>
-                                            <m:t>𝑦</m:t>
-                                          </m:r>
-                                        </m:e>
-                                      </m:acc>
-                                    </m:e>
-                                  </m:d>
-                                </m:e>
-                                <m:sup>
-                                  <m:r>
-                                    <a:rPr lang="fr-FR" sz="1400" b="0" i="1" smtClean="0">
-                                      <a:latin typeface="Cambria Math" panose="02040503050406030204" pitchFamily="18" charset="0"/>
-                                      <a:ea typeface="Cambria Math" panose="02040503050406030204" pitchFamily="18" charset="0"/>
-                                    </a:rPr>
-                                    <m:t>2</m:t>
-                                  </m:r>
-                                </m:sup>
-                              </m:sSup>
-                            </m:e>
-                          </m:nary>
-                        </m:den>
-                      </m:f>
-                    </m:oMath>
-                  </m:oMathPara>
-                </a14:m>
-                <a:endParaRPr lang="fr-FR" sz="1400" dirty="0">
-                  <a:latin typeface="Gill Sans MT" panose="020B0502020104020203" pitchFamily="34" charset="0"/>
-                </a:endParaRPr>
-              </a:p>
-            </p:txBody>
-          </p:sp>
-        </mc:Choice>
-        <mc:Fallback xmlns="">
-          <p:sp>
-            <p:nvSpPr>
-              <p:cNvPr id="15" name="ZoneTexte 14">
-                <a:extLst>
-                  <a:ext uri="{FF2B5EF4-FFF2-40B4-BE49-F238E27FC236}">
-                    <a16:creationId xmlns:a16="http://schemas.microsoft.com/office/drawing/2014/main" id="{C3B1FC5B-052E-6DDE-9DB3-DC96022BC6A3}"/>
-                  </a:ext>
-                </a:extLst>
-              </p:cNvPr>
-              <p:cNvSpPr txBox="1">
-                <a:spLocks noRot="1" noChangeAspect="1" noMove="1" noResize="1" noEditPoints="1" noAdjustHandles="1" noChangeArrowheads="1" noChangeShapeType="1" noTextEdit="1"/>
-              </p:cNvSpPr>
-              <p:nvPr/>
-            </p:nvSpPr>
-            <p:spPr>
-              <a:xfrm>
-                <a:off x="6202024" y="14869169"/>
-                <a:ext cx="4053566" cy="838435"/>
-              </a:xfrm>
-              <a:prstGeom prst="rect">
-                <a:avLst/>
-              </a:prstGeom>
-              <a:blipFill>
-                <a:blip r:embed="rId14"/>
-                <a:stretch>
-                  <a:fillRect/>
-                </a:stretch>
-              </a:blipFill>
-              <a:ln w="28575">
-                <a:solidFill>
-                  <a:srgbClr val="002060"/>
-                </a:solidFill>
-              </a:ln>
-            </p:spPr>
-            <p:txBody>
-              <a:bodyPr/>
-              <a:lstStyle/>
-              <a:p>
-                <a:r>
-                  <a:rPr lang="fr-FR">
-                    <a:noFill/>
-                  </a:rPr>
-                  <a:t> </a:t>
-                </a:r>
-              </a:p>
-            </p:txBody>
-          </p:sp>
-        </mc:Fallback>
-      </mc:AlternateContent>
       <p:sp>
         <p:nvSpPr>
           <p:cNvPr id="16" name="ZoneTexte 15">
@@ -6538,7 +5980,7 @@
           </a:bodyPr>
           <a:lstStyle/>
           <a:p>
-            <a:pPr algn="ctr">
+            <a:pPr algn="just">
               <a:lnSpc>
                 <a:spcPct val="150000"/>
               </a:lnSpc>
@@ -6564,8 +6006,8 @@
           </a:p>
         </p:txBody>
       </p:sp>
-      <mc:AlternateContent xmlns:mc="http://schemas.openxmlformats.org/markup-compatibility/2006">
-        <mc:Choice xmlns:a14="http://schemas.microsoft.com/office/drawing/2010/main" Requires="a14">
+      <mc:AlternateContent xmlns:mc="http://schemas.openxmlformats.org/markup-compatibility/2006" xmlns:a14="http://schemas.microsoft.com/office/drawing/2010/main">
+        <mc:Choice Requires="a14">
           <p:sp>
             <p:nvSpPr>
               <p:cNvPr id="19" name="ZoneTexte 18">
@@ -6645,7 +6087,7 @@
             </p:txBody>
           </p:sp>
         </mc:Choice>
-        <mc:Fallback>
+        <mc:Fallback xmlns="">
           <p:sp>
             <p:nvSpPr>
               <p:cNvPr id="19" name="ZoneTexte 18">
@@ -6808,24 +6250,13 @@
           </a:bodyPr>
           <a:lstStyle/>
           <a:p>
-            <a:pPr algn="ctr"/>
-            <a:r>
-              <a:rPr lang="fr-FR" sz="2000" b="0" i="0" dirty="0">
-                <a:solidFill>
-                  <a:srgbClr val="242424"/>
-                </a:solidFill>
-                <a:effectLst/>
-                <a:latin typeface="Segoe UI" panose="020B0502040204020203" pitchFamily="34" charset="0"/>
+            <a:pPr algn="just"/>
+            <a:r>
+              <a:rPr lang="fr-FR" sz="2000" dirty="0">
+                <a:latin typeface="Gill Sans MT" panose="020B0502020104020203" pitchFamily="34" charset="0"/>
               </a:rPr>
-              <a:t>Les taux de consultations observés et prédits présentent </a:t>
-            </a:r>
-            <a:r>
-              <a:rPr lang="fr-FR" sz="2000" dirty="0"/>
-              <a:t>structure spatiale globalement similaire. Certaines zones, notamment au sud-est et au nord-ouest, mettent toutefois en évidence des divergences marquées entre les valeurs observées et prédites.</a:t>
-            </a:r>
-            <a:endParaRPr lang="fr-FR" sz="2000" dirty="0">
-              <a:latin typeface="Gill Sans MT" panose="020B0502020104020203" pitchFamily="34" charset="0"/>
-            </a:endParaRPr>
+              <a:t>Les taux de consultations observés et prédits présentent une structure spatiale globalement similaire. Certaines zones, notamment au sud-est et au nord-ouest, mettent toutefois en évidence des divergences marquées entre les valeurs observées et prédites.</a:t>
+            </a:r>
           </a:p>
         </p:txBody>
       </p:sp>
@@ -6843,8 +6274,8 @@
         </p:nvSpPr>
         <p:spPr>
           <a:xfrm>
-            <a:off x="11285668" y="18267488"/>
-            <a:ext cx="4834865" cy="339812"/>
+            <a:off x="11122043" y="18267488"/>
+            <a:ext cx="4832428" cy="336919"/>
           </a:xfrm>
           <a:prstGeom prst="rect">
             <a:avLst/>
@@ -6870,8 +6301,8 @@
           </a:p>
         </p:txBody>
       </p:sp>
-      <mc:AlternateContent xmlns:mc="http://schemas.openxmlformats.org/markup-compatibility/2006">
-        <mc:Choice xmlns:a14="http://schemas.microsoft.com/office/drawing/2010/main" Requires="a14">
+      <mc:AlternateContent xmlns:mc="http://schemas.openxmlformats.org/markup-compatibility/2006" xmlns:a14="http://schemas.microsoft.com/office/drawing/2010/main">
+        <mc:Choice Requires="a14">
           <p:sp>
             <p:nvSpPr>
               <p:cNvPr id="28" name="ZoneTexte 27">
@@ -6988,7 +6419,7 @@
             </p:txBody>
           </p:sp>
         </mc:Choice>
-        <mc:Fallback>
+        <mc:Fallback xmlns="">
           <p:sp>
             <p:nvSpPr>
               <p:cNvPr id="28" name="ZoneTexte 27">
@@ -7527,8 +6958,8 @@
         </p:nvSpPr>
         <p:spPr>
           <a:xfrm>
-            <a:off x="11670670" y="15612194"/>
-            <a:ext cx="4066838" cy="338554"/>
+            <a:off x="14413023" y="15574156"/>
+            <a:ext cx="4066838" cy="400110"/>
           </a:xfrm>
           <a:prstGeom prst="rect">
             <a:avLst/>
@@ -7546,12 +6977,12 @@
               <a:buChar char="•"/>
             </a:pPr>
             <a:r>
-              <a:rPr lang="fr-FR" sz="1600" dirty="0">
+              <a:rPr lang="fr-FR" sz="2000" dirty="0">
                 <a:latin typeface="Gill Sans MT" panose="020B0502020104020203" pitchFamily="34" charset="0"/>
               </a:rPr>
               <a:t>Comparaison de modèles</a:t>
             </a:r>
-            <a:endParaRPr lang="fr-FR" sz="1600" b="1" dirty="0">
+            <a:endParaRPr lang="fr-FR" sz="2000" b="1" dirty="0">
               <a:latin typeface="Gill Sans MT" panose="020B0502020104020203" pitchFamily="34" charset="0"/>
             </a:endParaRPr>
           </a:p>
@@ -7713,8 +7144,8 @@
           </a:p>
         </p:txBody>
       </p:sp>
-      <mc:AlternateContent xmlns:mc="http://schemas.openxmlformats.org/markup-compatibility/2006">
-        <mc:Choice xmlns:a14="http://schemas.microsoft.com/office/drawing/2010/main" Requires="a14">
+      <mc:AlternateContent xmlns:mc="http://schemas.openxmlformats.org/markup-compatibility/2006" xmlns:a14="http://schemas.microsoft.com/office/drawing/2010/main">
+        <mc:Choice Requires="a14">
           <p:sp>
             <p:nvSpPr>
               <p:cNvPr id="39" name="ZoneTexte 38">
@@ -7838,7 +7269,7 @@
             </p:txBody>
           </p:sp>
         </mc:Choice>
-        <mc:Fallback>
+        <mc:Fallback xmlns="">
           <p:sp>
             <p:nvSpPr>
               <p:cNvPr id="39" name="ZoneTexte 38">
@@ -7897,8 +7328,8 @@
         </p:nvSpPr>
         <p:spPr>
           <a:xfrm rot="5400000">
-            <a:off x="18100281" y="18916763"/>
-            <a:ext cx="399954" cy="249105"/>
+            <a:off x="18176469" y="18840575"/>
+            <a:ext cx="302627" cy="304155"/>
           </a:xfrm>
           <a:prstGeom prst="stripedRightArrow">
             <a:avLst/>
@@ -7949,8 +7380,8 @@
         </p:nvSpPr>
         <p:spPr>
           <a:xfrm>
-            <a:off x="15722327" y="19246655"/>
-            <a:ext cx="4998978" cy="1631216"/>
+            <a:off x="16015823" y="19157755"/>
+            <a:ext cx="4705482" cy="1938992"/>
           </a:xfrm>
           <a:prstGeom prst="rect">
             <a:avLst/>
@@ -7963,7 +7394,7 @@
           </a:bodyPr>
           <a:lstStyle/>
           <a:p>
-            <a:pPr algn="ctr"/>
+            <a:pPr algn="just"/>
             <a:r>
               <a:rPr lang="fr-FR" sz="2000" dirty="0">
                 <a:latin typeface="Gill Sans MT" panose="020B0502020104020203" pitchFamily="34" charset="0"/>
@@ -7987,8 +7418,8 @@
         </p:nvSpPr>
         <p:spPr>
           <a:xfrm>
-            <a:off x="15554018" y="19241290"/>
-            <a:ext cx="5378770" cy="1648358"/>
+            <a:off x="15931652" y="19190490"/>
+            <a:ext cx="5001136" cy="1875434"/>
           </a:xfrm>
           <a:prstGeom prst="roundRect">
             <a:avLst/>
@@ -8678,7 +8109,7 @@
           </a:bodyPr>
           <a:lstStyle/>
           <a:p>
-            <a:pPr marL="0" marR="0" lvl="0" indent="0" algn="ctr" defTabSz="914400" rtl="0" eaLnBrk="0" fontAlgn="base" latinLnBrk="0" hangingPunct="0">
+            <a:pPr marL="0" marR="0" lvl="0" indent="0" algn="just" defTabSz="914400" rtl="0" eaLnBrk="0" fontAlgn="base" latinLnBrk="0" hangingPunct="0">
               <a:lnSpc>
                 <a:spcPct val="100000"/>
               </a:lnSpc>
@@ -8772,6 +8203,701 @@
           </a:p>
         </p:txBody>
       </p:sp>
+      <mc:AlternateContent xmlns:mc="http://schemas.openxmlformats.org/markup-compatibility/2006">
+        <mc:Choice xmlns:a14="http://schemas.microsoft.com/office/drawing/2010/main" Requires="a14">
+          <p:sp>
+            <p:nvSpPr>
+              <p:cNvPr id="23" name="Rectangle 22">
+                <a:extLst>
+                  <a:ext uri="{FF2B5EF4-FFF2-40B4-BE49-F238E27FC236}">
+                    <a16:creationId xmlns:a16="http://schemas.microsoft.com/office/drawing/2014/main" id="{27FF743D-08E4-F040-F47F-B72F503818DC}"/>
+                  </a:ext>
+                </a:extLst>
+              </p:cNvPr>
+              <p:cNvSpPr/>
+              <p:nvPr/>
+            </p:nvSpPr>
+            <p:spPr>
+              <a:xfrm>
+                <a:off x="6403696" y="14776793"/>
+                <a:ext cx="3837795" cy="1012275"/>
+              </a:xfrm>
+              <a:prstGeom prst="rect">
+                <a:avLst/>
+              </a:prstGeom>
+              <a:noFill/>
+              <a:ln w="28575">
+                <a:solidFill>
+                  <a:schemeClr val="tx1"/>
+                </a:solidFill>
+              </a:ln>
+            </p:spPr>
+            <p:style>
+              <a:lnRef idx="2">
+                <a:schemeClr val="accent1">
+                  <a:shade val="15000"/>
+                </a:schemeClr>
+              </a:lnRef>
+              <a:fillRef idx="1">
+                <a:schemeClr val="accent1"/>
+              </a:fillRef>
+              <a:effectRef idx="0">
+                <a:schemeClr val="accent1"/>
+              </a:effectRef>
+              <a:fontRef idx="minor">
+                <a:schemeClr val="lt1"/>
+              </a:fontRef>
+            </p:style>
+            <p:txBody>
+              <a:bodyPr rtlCol="0" anchor="ctr"/>
+              <a:lstStyle/>
+              <a:p>
+                <a:pPr algn="ctr"/>
+                <a:r>
+                  <a:rPr lang="fr-FR" sz="1400" b="1" dirty="0">
+                    <a:solidFill>
+                      <a:schemeClr val="tx1"/>
+                    </a:solidFill>
+                    <a:latin typeface="Gill Sans MT" panose="020B0502020104020203" pitchFamily="34" charset="0"/>
+                  </a:rPr>
+                  <a:t>Indice de Moran</a:t>
+                </a:r>
+              </a:p>
+              <a:p>
+                <a:pPr algn="ctr"/>
+                <a14:m>
+                  <m:oMathPara xmlns:m="http://schemas.openxmlformats.org/officeDocument/2006/math">
+                    <m:oMathParaPr>
+                      <m:jc m:val="centerGroup"/>
+                    </m:oMathParaPr>
+                    <m:oMath xmlns:m="http://schemas.openxmlformats.org/officeDocument/2006/math">
+                      <m:r>
+                        <a:rPr lang="fr-FR" sz="1400" i="1">
+                          <a:solidFill>
+                            <a:schemeClr val="tx1"/>
+                          </a:solidFill>
+                          <a:latin typeface="Cambria Math" panose="02040503050406030204" pitchFamily="18" charset="0"/>
+                        </a:rPr>
+                        <m:t>𝐼</m:t>
+                      </m:r>
+                      <m:r>
+                        <a:rPr lang="fr-FR" sz="1400" i="1">
+                          <a:solidFill>
+                            <a:schemeClr val="tx1"/>
+                          </a:solidFill>
+                          <a:latin typeface="Cambria Math" panose="02040503050406030204" pitchFamily="18" charset="0"/>
+                        </a:rPr>
+                        <m:t>=</m:t>
+                      </m:r>
+                      <m:f>
+                        <m:fPr>
+                          <m:ctrlPr>
+                            <a:rPr lang="fr-FR" sz="1400" i="1">
+                              <a:solidFill>
+                                <a:schemeClr val="tx1"/>
+                              </a:solidFill>
+                              <a:latin typeface="Cambria Math" panose="02040503050406030204" pitchFamily="18" charset="0"/>
+                            </a:rPr>
+                          </m:ctrlPr>
+                        </m:fPr>
+                        <m:num>
+                          <m:r>
+                            <a:rPr lang="fr-FR" sz="1400" i="1">
+                              <a:solidFill>
+                                <a:schemeClr val="tx1"/>
+                              </a:solidFill>
+                              <a:latin typeface="Cambria Math" panose="02040503050406030204" pitchFamily="18" charset="0"/>
+                            </a:rPr>
+                            <m:t>𝑁</m:t>
+                          </m:r>
+                        </m:num>
+                        <m:den>
+                          <m:nary>
+                            <m:naryPr>
+                              <m:chr m:val="∑"/>
+                              <m:limLoc m:val="subSup"/>
+                              <m:supHide m:val="on"/>
+                              <m:ctrlPr>
+                                <a:rPr lang="fr-FR" sz="1400" i="1">
+                                  <a:solidFill>
+                                    <a:schemeClr val="tx1"/>
+                                  </a:solidFill>
+                                  <a:latin typeface="Cambria Math" panose="02040503050406030204" pitchFamily="18" charset="0"/>
+                                </a:rPr>
+                              </m:ctrlPr>
+                            </m:naryPr>
+                            <m:sub>
+                              <m:r>
+                                <m:rPr>
+                                  <m:brk m:alnAt="9"/>
+                                </m:rPr>
+                                <a:rPr lang="fr-FR" sz="1400" i="1">
+                                  <a:solidFill>
+                                    <a:schemeClr val="tx1"/>
+                                  </a:solidFill>
+                                  <a:latin typeface="Cambria Math" panose="02040503050406030204" pitchFamily="18" charset="0"/>
+                                </a:rPr>
+                                <m:t>𝑖</m:t>
+                              </m:r>
+                            </m:sub>
+                            <m:sup/>
+                            <m:e>
+                              <m:nary>
+                                <m:naryPr>
+                                  <m:chr m:val="∑"/>
+                                  <m:limLoc m:val="subSup"/>
+                                  <m:supHide m:val="on"/>
+                                  <m:ctrlPr>
+                                    <a:rPr lang="fr-FR" sz="1400" i="1">
+                                      <a:solidFill>
+                                        <a:schemeClr val="tx1"/>
+                                      </a:solidFill>
+                                      <a:latin typeface="Cambria Math" panose="02040503050406030204" pitchFamily="18" charset="0"/>
+                                    </a:rPr>
+                                  </m:ctrlPr>
+                                </m:naryPr>
+                                <m:sub>
+                                  <m:r>
+                                    <m:rPr>
+                                      <m:brk m:alnAt="9"/>
+                                    </m:rPr>
+                                    <a:rPr lang="fr-FR" sz="1400" i="1">
+                                      <a:solidFill>
+                                        <a:schemeClr val="tx1"/>
+                                      </a:solidFill>
+                                      <a:latin typeface="Cambria Math" panose="02040503050406030204" pitchFamily="18" charset="0"/>
+                                    </a:rPr>
+                                    <m:t>𝑗</m:t>
+                                  </m:r>
+                                </m:sub>
+                                <m:sup/>
+                                <m:e>
+                                  <m:sSub>
+                                    <m:sSubPr>
+                                      <m:ctrlPr>
+                                        <a:rPr lang="fr-FR" sz="1400" i="1">
+                                          <a:solidFill>
+                                            <a:schemeClr val="tx1"/>
+                                          </a:solidFill>
+                                          <a:latin typeface="Cambria Math" panose="02040503050406030204" pitchFamily="18" charset="0"/>
+                                        </a:rPr>
+                                      </m:ctrlPr>
+                                    </m:sSubPr>
+                                    <m:e>
+                                      <m:r>
+                                        <a:rPr lang="fr-FR" sz="1400" i="1">
+                                          <a:solidFill>
+                                            <a:schemeClr val="tx1"/>
+                                          </a:solidFill>
+                                          <a:latin typeface="Cambria Math" panose="02040503050406030204" pitchFamily="18" charset="0"/>
+                                        </a:rPr>
+                                        <m:t>𝑊</m:t>
+                                      </m:r>
+                                    </m:e>
+                                    <m:sub>
+                                      <m:r>
+                                        <a:rPr lang="fr-FR" sz="1400" i="1">
+                                          <a:solidFill>
+                                            <a:schemeClr val="tx1"/>
+                                          </a:solidFill>
+                                          <a:latin typeface="Cambria Math" panose="02040503050406030204" pitchFamily="18" charset="0"/>
+                                        </a:rPr>
+                                        <m:t>𝑖𝑗</m:t>
+                                      </m:r>
+                                    </m:sub>
+                                  </m:sSub>
+                                </m:e>
+                              </m:nary>
+                            </m:e>
+                          </m:nary>
+                        </m:den>
+                      </m:f>
+                      <m:r>
+                        <a:rPr lang="fr-FR" sz="1400" i="1">
+                          <a:solidFill>
+                            <a:schemeClr val="tx1"/>
+                          </a:solidFill>
+                          <a:latin typeface="Cambria Math" panose="02040503050406030204" pitchFamily="18" charset="0"/>
+                        </a:rPr>
+                        <m:t>∙</m:t>
+                      </m:r>
+                      <m:f>
+                        <m:fPr>
+                          <m:ctrlPr>
+                            <a:rPr lang="fr-FR" sz="1400" i="1">
+                              <a:solidFill>
+                                <a:schemeClr val="tx1"/>
+                              </a:solidFill>
+                              <a:latin typeface="Cambria Math" panose="02040503050406030204" pitchFamily="18" charset="0"/>
+                            </a:rPr>
+                          </m:ctrlPr>
+                        </m:fPr>
+                        <m:num>
+                          <m:nary>
+                            <m:naryPr>
+                              <m:chr m:val="∑"/>
+                              <m:limLoc m:val="subSup"/>
+                              <m:supHide m:val="on"/>
+                              <m:ctrlPr>
+                                <a:rPr lang="fr-FR" sz="1400" i="1">
+                                  <a:solidFill>
+                                    <a:schemeClr val="tx1"/>
+                                  </a:solidFill>
+                                  <a:latin typeface="Cambria Math" panose="02040503050406030204" pitchFamily="18" charset="0"/>
+                                </a:rPr>
+                              </m:ctrlPr>
+                            </m:naryPr>
+                            <m:sub>
+                              <m:r>
+                                <m:rPr>
+                                  <m:brk m:alnAt="9"/>
+                                </m:rPr>
+                                <a:rPr lang="fr-FR" sz="1400" i="1">
+                                  <a:solidFill>
+                                    <a:schemeClr val="tx1"/>
+                                  </a:solidFill>
+                                  <a:latin typeface="Cambria Math" panose="02040503050406030204" pitchFamily="18" charset="0"/>
+                                </a:rPr>
+                                <m:t>𝑖</m:t>
+                              </m:r>
+                            </m:sub>
+                            <m:sup/>
+                            <m:e>
+                              <m:nary>
+                                <m:naryPr>
+                                  <m:chr m:val="∑"/>
+                                  <m:limLoc m:val="subSup"/>
+                                  <m:supHide m:val="on"/>
+                                  <m:ctrlPr>
+                                    <a:rPr lang="fr-FR" sz="1400" i="1">
+                                      <a:solidFill>
+                                        <a:schemeClr val="tx1"/>
+                                      </a:solidFill>
+                                      <a:latin typeface="Cambria Math" panose="02040503050406030204" pitchFamily="18" charset="0"/>
+                                    </a:rPr>
+                                  </m:ctrlPr>
+                                </m:naryPr>
+                                <m:sub>
+                                  <m:r>
+                                    <m:rPr>
+                                      <m:brk m:alnAt="9"/>
+                                    </m:rPr>
+                                    <a:rPr lang="fr-FR" sz="1400" i="1">
+                                      <a:solidFill>
+                                        <a:schemeClr val="tx1"/>
+                                      </a:solidFill>
+                                      <a:latin typeface="Cambria Math" panose="02040503050406030204" pitchFamily="18" charset="0"/>
+                                    </a:rPr>
+                                    <m:t>𝑗</m:t>
+                                  </m:r>
+                                </m:sub>
+                                <m:sup/>
+                                <m:e>
+                                  <m:sSub>
+                                    <m:sSubPr>
+                                      <m:ctrlPr>
+                                        <a:rPr lang="fr-FR" sz="1400" i="1">
+                                          <a:solidFill>
+                                            <a:schemeClr val="tx1"/>
+                                          </a:solidFill>
+                                          <a:latin typeface="Cambria Math" panose="02040503050406030204" pitchFamily="18" charset="0"/>
+                                        </a:rPr>
+                                      </m:ctrlPr>
+                                    </m:sSubPr>
+                                    <m:e>
+                                      <m:r>
+                                        <a:rPr lang="fr-FR" sz="1400" i="1">
+                                          <a:solidFill>
+                                            <a:schemeClr val="tx1"/>
+                                          </a:solidFill>
+                                          <a:latin typeface="Cambria Math" panose="02040503050406030204" pitchFamily="18" charset="0"/>
+                                        </a:rPr>
+                                        <m:t>𝑊</m:t>
+                                      </m:r>
+                                    </m:e>
+                                    <m:sub>
+                                      <m:r>
+                                        <a:rPr lang="fr-FR" sz="1400" i="1">
+                                          <a:solidFill>
+                                            <a:schemeClr val="tx1"/>
+                                          </a:solidFill>
+                                          <a:latin typeface="Cambria Math" panose="02040503050406030204" pitchFamily="18" charset="0"/>
+                                        </a:rPr>
+                                        <m:t>𝑖𝑗</m:t>
+                                      </m:r>
+                                    </m:sub>
+                                  </m:sSub>
+                                </m:e>
+                              </m:nary>
+                            </m:e>
+                          </m:nary>
+                          <m:d>
+                            <m:dPr>
+                              <m:ctrlPr>
+                                <a:rPr lang="fr-FR" sz="1400" i="1">
+                                  <a:solidFill>
+                                    <a:schemeClr val="tx1"/>
+                                  </a:solidFill>
+                                  <a:latin typeface="Cambria Math" panose="02040503050406030204" pitchFamily="18" charset="0"/>
+                                </a:rPr>
+                              </m:ctrlPr>
+                            </m:dPr>
+                            <m:e>
+                              <m:sSub>
+                                <m:sSubPr>
+                                  <m:ctrlPr>
+                                    <a:rPr lang="fr-FR" sz="1400" i="1">
+                                      <a:solidFill>
+                                        <a:schemeClr val="tx1"/>
+                                      </a:solidFill>
+                                      <a:latin typeface="Cambria Math" panose="02040503050406030204" pitchFamily="18" charset="0"/>
+                                    </a:rPr>
+                                  </m:ctrlPr>
+                                </m:sSubPr>
+                                <m:e>
+                                  <m:r>
+                                    <a:rPr lang="fr-FR" sz="1400" i="1">
+                                      <a:solidFill>
+                                        <a:schemeClr val="tx1"/>
+                                      </a:solidFill>
+                                      <a:latin typeface="Cambria Math" panose="02040503050406030204" pitchFamily="18" charset="0"/>
+                                    </a:rPr>
+                                    <m:t>𝑦</m:t>
+                                  </m:r>
+                                </m:e>
+                                <m:sub>
+                                  <m:r>
+                                    <a:rPr lang="fr-FR" sz="1400" i="1">
+                                      <a:solidFill>
+                                        <a:schemeClr val="tx1"/>
+                                      </a:solidFill>
+                                      <a:latin typeface="Cambria Math" panose="02040503050406030204" pitchFamily="18" charset="0"/>
+                                    </a:rPr>
+                                    <m:t>𝑖</m:t>
+                                  </m:r>
+                                </m:sub>
+                              </m:sSub>
+                              <m:r>
+                                <a:rPr lang="fr-FR" sz="1400" i="1">
+                                  <a:solidFill>
+                                    <a:schemeClr val="tx1"/>
+                                  </a:solidFill>
+                                  <a:latin typeface="Cambria Math" panose="02040503050406030204" pitchFamily="18" charset="0"/>
+                                </a:rPr>
+                                <m:t>−</m:t>
+                              </m:r>
+                              <m:acc>
+                                <m:accPr>
+                                  <m:chr m:val="̅"/>
+                                  <m:ctrlPr>
+                                    <a:rPr lang="fr-FR" sz="1400" i="1">
+                                      <a:solidFill>
+                                        <a:schemeClr val="tx1"/>
+                                      </a:solidFill>
+                                      <a:latin typeface="Cambria Math" panose="02040503050406030204" pitchFamily="18" charset="0"/>
+                                    </a:rPr>
+                                  </m:ctrlPr>
+                                </m:accPr>
+                                <m:e>
+                                  <m:r>
+                                    <a:rPr lang="fr-FR" sz="1400" i="1">
+                                      <a:solidFill>
+                                        <a:schemeClr val="tx1"/>
+                                      </a:solidFill>
+                                      <a:latin typeface="Cambria Math" panose="02040503050406030204" pitchFamily="18" charset="0"/>
+                                    </a:rPr>
+                                    <m:t>𝑦</m:t>
+                                  </m:r>
+                                </m:e>
+                              </m:acc>
+                            </m:e>
+                          </m:d>
+                          <m:d>
+                            <m:dPr>
+                              <m:ctrlPr>
+                                <a:rPr lang="fr-FR" sz="1400" i="1">
+                                  <a:solidFill>
+                                    <a:schemeClr val="tx1"/>
+                                  </a:solidFill>
+                                  <a:latin typeface="Cambria Math" panose="02040503050406030204" pitchFamily="18" charset="0"/>
+                                </a:rPr>
+                              </m:ctrlPr>
+                            </m:dPr>
+                            <m:e>
+                              <m:sSub>
+                                <m:sSubPr>
+                                  <m:ctrlPr>
+                                    <a:rPr lang="fr-FR" sz="1400" i="1">
+                                      <a:solidFill>
+                                        <a:schemeClr val="tx1"/>
+                                      </a:solidFill>
+                                      <a:latin typeface="Cambria Math" panose="02040503050406030204" pitchFamily="18" charset="0"/>
+                                    </a:rPr>
+                                  </m:ctrlPr>
+                                </m:sSubPr>
+                                <m:e>
+                                  <m:r>
+                                    <a:rPr lang="fr-FR" sz="1400" i="1">
+                                      <a:solidFill>
+                                        <a:schemeClr val="tx1"/>
+                                      </a:solidFill>
+                                      <a:latin typeface="Cambria Math" panose="02040503050406030204" pitchFamily="18" charset="0"/>
+                                    </a:rPr>
+                                    <m:t>𝑦</m:t>
+                                  </m:r>
+                                </m:e>
+                                <m:sub>
+                                  <m:r>
+                                    <a:rPr lang="fr-FR" sz="1400" i="1">
+                                      <a:solidFill>
+                                        <a:schemeClr val="tx1"/>
+                                      </a:solidFill>
+                                      <a:latin typeface="Cambria Math" panose="02040503050406030204" pitchFamily="18" charset="0"/>
+                                    </a:rPr>
+                                    <m:t>𝑗</m:t>
+                                  </m:r>
+                                </m:sub>
+                              </m:sSub>
+                              <m:r>
+                                <a:rPr lang="fr-FR" sz="1400" i="1">
+                                  <a:solidFill>
+                                    <a:schemeClr val="tx1"/>
+                                  </a:solidFill>
+                                  <a:latin typeface="Cambria Math" panose="02040503050406030204" pitchFamily="18" charset="0"/>
+                                </a:rPr>
+                                <m:t>−</m:t>
+                              </m:r>
+                              <m:acc>
+                                <m:accPr>
+                                  <m:chr m:val="̅"/>
+                                  <m:ctrlPr>
+                                    <a:rPr lang="fr-FR" sz="1400" i="1">
+                                      <a:solidFill>
+                                        <a:schemeClr val="tx1"/>
+                                      </a:solidFill>
+                                      <a:latin typeface="Cambria Math" panose="02040503050406030204" pitchFamily="18" charset="0"/>
+                                    </a:rPr>
+                                  </m:ctrlPr>
+                                </m:accPr>
+                                <m:e>
+                                  <m:r>
+                                    <a:rPr lang="fr-FR" sz="1400" i="1">
+                                      <a:solidFill>
+                                        <a:schemeClr val="tx1"/>
+                                      </a:solidFill>
+                                      <a:latin typeface="Cambria Math" panose="02040503050406030204" pitchFamily="18" charset="0"/>
+                                    </a:rPr>
+                                    <m:t>𝑦</m:t>
+                                  </m:r>
+                                </m:e>
+                              </m:acc>
+                            </m:e>
+                          </m:d>
+                        </m:num>
+                        <m:den>
+                          <m:nary>
+                            <m:naryPr>
+                              <m:chr m:val="∑"/>
+                              <m:limLoc m:val="subSup"/>
+                              <m:supHide m:val="on"/>
+                              <m:ctrlPr>
+                                <a:rPr lang="fr-FR" sz="1400" i="1">
+                                  <a:solidFill>
+                                    <a:schemeClr val="tx1"/>
+                                  </a:solidFill>
+                                  <a:latin typeface="Cambria Math" panose="02040503050406030204" pitchFamily="18" charset="0"/>
+                                </a:rPr>
+                              </m:ctrlPr>
+                            </m:naryPr>
+                            <m:sub>
+                              <m:r>
+                                <m:rPr>
+                                  <m:brk m:alnAt="9"/>
+                                </m:rPr>
+                                <a:rPr lang="fr-FR" sz="1400" i="1">
+                                  <a:solidFill>
+                                    <a:schemeClr val="tx1"/>
+                                  </a:solidFill>
+                                  <a:latin typeface="Cambria Math" panose="02040503050406030204" pitchFamily="18" charset="0"/>
+                                </a:rPr>
+                                <m:t>𝑖</m:t>
+                              </m:r>
+                            </m:sub>
+                            <m:sup/>
+                            <m:e>
+                              <m:sSup>
+                                <m:sSupPr>
+                                  <m:ctrlPr>
+                                    <a:rPr lang="fr-FR" sz="1400" i="1">
+                                      <a:solidFill>
+                                        <a:schemeClr val="tx1"/>
+                                      </a:solidFill>
+                                      <a:latin typeface="Cambria Math" panose="02040503050406030204" pitchFamily="18" charset="0"/>
+                                    </a:rPr>
+                                  </m:ctrlPr>
+                                </m:sSupPr>
+                                <m:e>
+                                  <m:d>
+                                    <m:dPr>
+                                      <m:ctrlPr>
+                                        <a:rPr lang="fr-FR" sz="1400" i="1">
+                                          <a:solidFill>
+                                            <a:schemeClr val="tx1"/>
+                                          </a:solidFill>
+                                          <a:latin typeface="Cambria Math" panose="02040503050406030204" pitchFamily="18" charset="0"/>
+                                        </a:rPr>
+                                      </m:ctrlPr>
+                                    </m:dPr>
+                                    <m:e>
+                                      <m:sSub>
+                                        <m:sSubPr>
+                                          <m:ctrlPr>
+                                            <a:rPr lang="fr-FR" sz="1400" i="1">
+                                              <a:solidFill>
+                                                <a:schemeClr val="tx1"/>
+                                              </a:solidFill>
+                                              <a:latin typeface="Cambria Math" panose="02040503050406030204" pitchFamily="18" charset="0"/>
+                                            </a:rPr>
+                                          </m:ctrlPr>
+                                        </m:sSubPr>
+                                        <m:e>
+                                          <m:r>
+                                            <a:rPr lang="fr-FR" sz="1400" i="1">
+                                              <a:solidFill>
+                                                <a:schemeClr val="tx1"/>
+                                              </a:solidFill>
+                                              <a:latin typeface="Cambria Math" panose="02040503050406030204" pitchFamily="18" charset="0"/>
+                                            </a:rPr>
+                                            <m:t>𝑦</m:t>
+                                          </m:r>
+                                        </m:e>
+                                        <m:sub>
+                                          <m:r>
+                                            <a:rPr lang="fr-FR" sz="1400" i="1">
+                                              <a:solidFill>
+                                                <a:schemeClr val="tx1"/>
+                                              </a:solidFill>
+                                              <a:latin typeface="Cambria Math" panose="02040503050406030204" pitchFamily="18" charset="0"/>
+                                            </a:rPr>
+                                            <m:t>𝑖</m:t>
+                                          </m:r>
+                                        </m:sub>
+                                      </m:sSub>
+                                      <m:r>
+                                        <a:rPr lang="fr-FR" sz="1400" i="1">
+                                          <a:solidFill>
+                                            <a:schemeClr val="tx1"/>
+                                          </a:solidFill>
+                                          <a:latin typeface="Cambria Math" panose="02040503050406030204" pitchFamily="18" charset="0"/>
+                                        </a:rPr>
+                                        <m:t>−</m:t>
+                                      </m:r>
+                                      <m:acc>
+                                        <m:accPr>
+                                          <m:chr m:val="̅"/>
+                                          <m:ctrlPr>
+                                            <a:rPr lang="fr-FR" sz="1400" i="1">
+                                              <a:solidFill>
+                                                <a:schemeClr val="tx1"/>
+                                              </a:solidFill>
+                                              <a:latin typeface="Cambria Math" panose="02040503050406030204" pitchFamily="18" charset="0"/>
+                                            </a:rPr>
+                                          </m:ctrlPr>
+                                        </m:accPr>
+                                        <m:e>
+                                          <m:r>
+                                            <a:rPr lang="fr-FR" sz="1400" i="1">
+                                              <a:solidFill>
+                                                <a:schemeClr val="tx1"/>
+                                              </a:solidFill>
+                                              <a:latin typeface="Cambria Math" panose="02040503050406030204" pitchFamily="18" charset="0"/>
+                                            </a:rPr>
+                                            <m:t>𝑦</m:t>
+                                          </m:r>
+                                        </m:e>
+                                      </m:acc>
+                                    </m:e>
+                                  </m:d>
+                                </m:e>
+                                <m:sup>
+                                  <m:r>
+                                    <a:rPr lang="fr-FR" sz="1400" i="1">
+                                      <a:solidFill>
+                                        <a:schemeClr val="tx1"/>
+                                      </a:solidFill>
+                                      <a:latin typeface="Cambria Math" panose="02040503050406030204" pitchFamily="18" charset="0"/>
+                                    </a:rPr>
+                                    <m:t>2</m:t>
+                                  </m:r>
+                                </m:sup>
+                              </m:sSup>
+                            </m:e>
+                          </m:nary>
+                        </m:den>
+                      </m:f>
+                    </m:oMath>
+                  </m:oMathPara>
+                </a14:m>
+                <a:endParaRPr lang="en-US" sz="1400" i="1" dirty="0">
+                  <a:solidFill>
+                    <a:schemeClr val="tx1"/>
+                  </a:solidFill>
+                  <a:latin typeface="Cambria Math" panose="02040503050406030204" pitchFamily="18" charset="0"/>
+                </a:endParaRPr>
+              </a:p>
+            </p:txBody>
+          </p:sp>
+        </mc:Choice>
+        <mc:Fallback>
+          <p:sp>
+            <p:nvSpPr>
+              <p:cNvPr id="23" name="Rectangle 22">
+                <a:extLst>
+                  <a:ext uri="{FF2B5EF4-FFF2-40B4-BE49-F238E27FC236}">
+                    <a16:creationId xmlns:a16="http://schemas.microsoft.com/office/drawing/2014/main" id="{27FF743D-08E4-F040-F47F-B72F503818DC}"/>
+                  </a:ext>
+                </a:extLst>
+              </p:cNvPr>
+              <p:cNvSpPr>
+                <a:spLocks noRot="1" noChangeAspect="1" noMove="1" noResize="1" noEditPoints="1" noAdjustHandles="1" noChangeArrowheads="1" noChangeShapeType="1" noTextEdit="1"/>
+              </p:cNvSpPr>
+              <p:nvPr/>
+            </p:nvSpPr>
+            <p:spPr>
+              <a:xfrm>
+                <a:off x="6403696" y="14776793"/>
+                <a:ext cx="3837795" cy="1012275"/>
+              </a:xfrm>
+              <a:prstGeom prst="rect">
+                <a:avLst/>
+              </a:prstGeom>
+              <a:blipFill>
+                <a:blip r:embed="rId23"/>
+                <a:stretch>
+                  <a:fillRect/>
+                </a:stretch>
+              </a:blipFill>
+              <a:ln w="28575">
+                <a:solidFill>
+                  <a:schemeClr val="tx1"/>
+                </a:solidFill>
+              </a:ln>
+            </p:spPr>
+            <p:txBody>
+              <a:bodyPr/>
+              <a:lstStyle/>
+              <a:p>
+                <a:r>
+                  <a:rPr lang="en-US">
+                    <a:noFill/>
+                  </a:rPr>
+                  <a:t> </a:t>
+                </a:r>
+              </a:p>
+            </p:txBody>
+          </p:sp>
+        </mc:Fallback>
+      </mc:AlternateContent>
     </p:spTree>
     <p:extLst>
       <p:ext uri="{BB962C8B-B14F-4D97-AF65-F5344CB8AC3E}">

</xml_diff>

<commit_message>
Ves=rsion .pdf du poster
</commit_message>
<xml_diff>
--- a/Présentation/MODELISATION-DU-NOMBRE-DE-VISITES.pptx
+++ b/Présentation/MODELISATION-DU-NOMBRE-DE-VISITES.pptx
@@ -8203,8 +8203,8 @@
           </a:p>
         </p:txBody>
       </p:sp>
-      <mc:AlternateContent xmlns:mc="http://schemas.openxmlformats.org/markup-compatibility/2006">
-        <mc:Choice xmlns:a14="http://schemas.microsoft.com/office/drawing/2010/main" Requires="a14">
+      <mc:AlternateContent xmlns:mc="http://schemas.openxmlformats.org/markup-compatibility/2006" xmlns:a14="http://schemas.microsoft.com/office/drawing/2010/main">
+        <mc:Choice Requires="a14">
           <p:sp>
             <p:nvSpPr>
               <p:cNvPr id="23" name="Rectangle 22">
@@ -8848,7 +8848,7 @@
             </p:txBody>
           </p:sp>
         </mc:Choice>
-        <mc:Fallback>
+        <mc:Fallback xmlns="">
           <p:sp>
             <p:nvSpPr>
               <p:cNvPr id="23" name="Rectangle 22">

</xml_diff>